<commit_message>
Aula dia 10-11 com parte teorica
</commit_message>
<xml_diff>
--- a/Aula3/Atividades.pptx
+++ b/Aula3/Atividades.pptx
@@ -5,17 +5,21 @@
     <p:sldMasterId id="2147483672" r:id="rId1"/>
   </p:sldMasterIdLst>
   <p:notesMasterIdLst>
-    <p:notesMasterId r:id="rId7"/>
+    <p:notesMasterId r:id="rId11"/>
   </p:notesMasterIdLst>
   <p:handoutMasterIdLst>
-    <p:handoutMasterId r:id="rId8"/>
+    <p:handoutMasterId r:id="rId12"/>
   </p:handoutMasterIdLst>
   <p:sldIdLst>
     <p:sldId id="256" r:id="rId2"/>
-    <p:sldId id="320" r:id="rId3"/>
-    <p:sldId id="321" r:id="rId4"/>
-    <p:sldId id="324" r:id="rId5"/>
-    <p:sldId id="323" r:id="rId6"/>
+    <p:sldId id="257" r:id="rId3"/>
+    <p:sldId id="258" r:id="rId4"/>
+    <p:sldId id="259" r:id="rId5"/>
+    <p:sldId id="260" r:id="rId6"/>
+    <p:sldId id="264" r:id="rId7"/>
+    <p:sldId id="261" r:id="rId8"/>
+    <p:sldId id="262" r:id="rId9"/>
+    <p:sldId id="263" r:id="rId10"/>
   </p:sldIdLst>
   <p:sldSz cx="12192000" cy="6858000"/>
   <p:notesSz cx="6858000" cy="9144000"/>
@@ -207,7 +211,7 @@
           <a:p>
             <a:fld id="{CE9EE758-9CAE-433F-B796-16C56E17460B}" type="datetimeFigureOut">
               <a:rPr lang="pt-BR" smtClean="0"/>
-              <a:t>09/11/2018</a:t>
+              <a:t>12/11/2018</a:t>
             </a:fld>
             <a:endParaRPr lang="pt-BR"/>
           </a:p>
@@ -373,7 +377,7 @@
           <a:p>
             <a:fld id="{FBCA46B2-73EF-4C4A-BBF3-1FCF65D31F9F}" type="datetimeFigureOut">
               <a:rPr lang="pt-BR" smtClean="0"/>
-              <a:t>09/11/2018</a:t>
+              <a:t>12/11/2018</a:t>
             </a:fld>
             <a:endParaRPr lang="pt-BR"/>
           </a:p>
@@ -832,7 +836,7 @@
           <a:graphicData uri="http://schemas.openxmlformats.org/presentationml/2006/ole">
             <mc:AlternateContent xmlns:mc="http://schemas.openxmlformats.org/markup-compatibility/2006">
               <mc:Choice xmlns:v="urn:schemas-microsoft-com:vml" Requires="v">
-                <p:oleObj spid="_x0000_s1125" name="Slide do think-cell" r:id="rId6" imgW="270" imgH="270" progId="TCLayout.ActiveDocument.1">
+                <p:oleObj spid="_x0000_s1128" name="Slide do think-cell" r:id="rId6" imgW="270" imgH="270" progId="TCLayout.ActiveDocument.1">
                   <p:embed/>
                 </p:oleObj>
               </mc:Choice>
@@ -1533,8 +1537,8 @@
         </p:nvSpPr>
         <p:spPr>
           <a:xfrm>
-            <a:off x="691012" y="871369"/>
-            <a:ext cx="10896600" cy="2817812"/>
+            <a:off x="3048000" y="1547813"/>
+            <a:ext cx="9144000" cy="2109787"/>
           </a:xfrm>
         </p:spPr>
         <p:txBody>
@@ -1543,104 +1547,119 @@
           </a:bodyPr>
           <a:lstStyle/>
           <a:p>
-            <a:pPr marL="0" indent="0" algn="just">
-              <a:buNone/>
+            <a:pPr>
+              <a:lnSpc>
+                <a:spcPct val="150000"/>
+              </a:lnSpc>
             </a:pPr>
             <a:r>
-              <a:rPr lang="pt-BR" sz="1800" dirty="0" smtClean="0"/>
-              <a:t>Uma empresa com 3 filiais e matriz esta montando seu orçamento de despesas anual. Todas as filiais possuem seus gastos de acordo com a politica abaixo:</a:t>
-            </a:r>
-          </a:p>
-          <a:p>
-            <a:pPr algn="just"/>
-            <a:r>
-              <a:rPr lang="pt-BR" sz="1800" dirty="0"/>
-              <a:t>Filial Ceará: possui o equivalente à 2 X o Budget da </a:t>
-            </a:r>
-            <a:r>
-              <a:rPr lang="pt-BR" sz="1800" dirty="0" smtClean="0"/>
-              <a:t>Matriz.</a:t>
-            </a:r>
-            <a:endParaRPr lang="pt-BR" sz="1800" dirty="0"/>
-          </a:p>
-          <a:p>
-            <a:pPr algn="just"/>
-            <a:r>
-              <a:rPr lang="pt-BR" sz="1800" dirty="0" smtClean="0"/>
-              <a:t>Filial Rio: possui 70% do Budget da filial Ceará.</a:t>
-            </a:r>
-          </a:p>
-          <a:p>
-            <a:pPr algn="just"/>
-            <a:r>
-              <a:rPr lang="pt-BR" sz="1800" dirty="0" smtClean="0"/>
-              <a:t>Filial </a:t>
-            </a:r>
-            <a:r>
-              <a:rPr lang="pt-BR" sz="1800" dirty="0"/>
-              <a:t>SP: possui o equivalente </a:t>
-            </a:r>
-            <a:r>
-              <a:rPr lang="pt-BR" sz="1800" dirty="0" smtClean="0"/>
-              <a:t>ao Budget </a:t>
-            </a:r>
-            <a:r>
-              <a:rPr lang="pt-BR" sz="1800" dirty="0"/>
-              <a:t>da </a:t>
-            </a:r>
-            <a:r>
-              <a:rPr lang="pt-BR" sz="1800" dirty="0" smtClean="0"/>
-              <a:t>matriz + </a:t>
-            </a:r>
-            <a:r>
-              <a:rPr lang="pt-BR" sz="1800" dirty="0"/>
-              <a:t>30% da filial Rio.</a:t>
-            </a:r>
-          </a:p>
-          <a:p>
-            <a:pPr algn="just"/>
-            <a:r>
-              <a:rPr lang="pt-BR" sz="1800" dirty="0" smtClean="0"/>
-              <a:t>Despesa de salários: FIXO em 21.300.000R$/ ano para cada uma das Filiais.</a:t>
-            </a:r>
-          </a:p>
-          <a:p>
-            <a:pPr algn="just"/>
-            <a:r>
-              <a:rPr lang="pt-BR" sz="1800" dirty="0" smtClean="0"/>
-              <a:t>Fazer o orçamento de cada filial em uma aba separada e uma consolidada com a soma de toda a empresa (inclusive Matriz). </a:t>
-            </a:r>
-            <a:endParaRPr lang="pt-BR" sz="1800" dirty="0"/>
+              <a:rPr lang="pt-BR" sz="2000" dirty="0"/>
+              <a:t>Função com </a:t>
+            </a:r>
+            <a:r>
+              <a:rPr lang="pt-BR" sz="2000" dirty="0" smtClean="0"/>
+              <a:t>argumento</a:t>
+            </a:r>
+          </a:p>
+          <a:p>
+            <a:pPr>
+              <a:lnSpc>
+                <a:spcPct val="150000"/>
+              </a:lnSpc>
+            </a:pPr>
+            <a:r>
+              <a:rPr lang="pt-BR" sz="2000" dirty="0"/>
+              <a:t>Editar, </a:t>
+            </a:r>
+            <a:r>
+              <a:rPr lang="pt-BR" sz="2000" dirty="0" smtClean="0"/>
+              <a:t>Excluir , Inserir comentários e imagens</a:t>
+            </a:r>
+          </a:p>
+          <a:p>
+            <a:pPr>
+              <a:lnSpc>
+                <a:spcPct val="150000"/>
+              </a:lnSpc>
+            </a:pPr>
+            <a:r>
+              <a:rPr lang="pt-BR" sz="2000" dirty="0" smtClean="0"/>
+              <a:t>Ocultar e </a:t>
+            </a:r>
+            <a:r>
+              <a:rPr lang="pt-BR" sz="2000" dirty="0" err="1" smtClean="0"/>
+              <a:t>Desocultar</a:t>
+            </a:r>
+            <a:r>
+              <a:rPr lang="pt-BR" sz="2000" dirty="0" smtClean="0"/>
+              <a:t>  linha e Coluna</a:t>
+            </a:r>
+          </a:p>
+          <a:p>
+            <a:pPr>
+              <a:lnSpc>
+                <a:spcPct val="150000"/>
+              </a:lnSpc>
+            </a:pPr>
+            <a:r>
+              <a:rPr lang="pt-BR" sz="2000" dirty="0" smtClean="0"/>
+              <a:t>Estrutura de Tópico – Agrupar linha e Coluna</a:t>
+            </a:r>
+          </a:p>
+          <a:p>
+            <a:pPr>
+              <a:lnSpc>
+                <a:spcPct val="150000"/>
+              </a:lnSpc>
+            </a:pPr>
+            <a:r>
+              <a:rPr lang="pt-BR" sz="2000" dirty="0" smtClean="0"/>
+              <a:t>Inserir, Ocultar, </a:t>
+            </a:r>
+            <a:r>
+              <a:rPr lang="pt-BR" sz="2000" dirty="0" err="1" smtClean="0"/>
+              <a:t>Desocultar</a:t>
+            </a:r>
+            <a:r>
+              <a:rPr lang="pt-BR" sz="2000" dirty="0" smtClean="0"/>
+              <a:t>, Copiar</a:t>
+            </a:r>
+            <a:r>
+              <a:rPr lang="pt-BR" sz="2000" dirty="0"/>
+              <a:t>,</a:t>
+            </a:r>
+            <a:r>
+              <a:rPr lang="pt-BR" sz="2000" dirty="0" smtClean="0"/>
+              <a:t>  Deletar múltiplas planilhas</a:t>
+            </a:r>
+          </a:p>
+          <a:p>
+            <a:pPr>
+              <a:lnSpc>
+                <a:spcPct val="150000"/>
+              </a:lnSpc>
+            </a:pPr>
+            <a:r>
+              <a:rPr lang="pt-BR" sz="2000" dirty="0" smtClean="0"/>
+              <a:t>Trabalhar com fórmulas entre planilhas</a:t>
+            </a:r>
+          </a:p>
+          <a:p>
+            <a:pPr>
+              <a:lnSpc>
+                <a:spcPct val="150000"/>
+              </a:lnSpc>
+            </a:pPr>
+            <a:r>
+              <a:rPr lang="pt-BR" sz="2000" dirty="0" smtClean="0"/>
+              <a:t>Formulas tridimensionais</a:t>
+            </a:r>
           </a:p>
         </p:txBody>
       </p:sp>
-      <p:pic>
-        <p:nvPicPr>
-          <p:cNvPr id="2" name="Imagem 1"/>
-          <p:cNvPicPr>
-            <a:picLocks noChangeAspect="1"/>
-          </p:cNvPicPr>
-          <p:nvPr/>
-        </p:nvPicPr>
-        <p:blipFill>
-          <a:blip r:embed="rId2"/>
-          <a:stretch>
-            <a:fillRect/>
-          </a:stretch>
-        </p:blipFill>
-        <p:spPr>
-          <a:xfrm>
-            <a:off x="1106161" y="3537507"/>
-            <a:ext cx="3881884" cy="3005330"/>
-          </a:xfrm>
-          <a:prstGeom prst="rect">
-            <a:avLst/>
-          </a:prstGeom>
-        </p:spPr>
-      </p:pic>
       <p:sp>
         <p:nvSpPr>
-          <p:cNvPr id="5" name="Subtítulo 1"/>
+          <p:cNvPr id="4" name="Subtítulo 1"/>
           <p:cNvSpPr txBox="1">
             <a:spLocks/>
           </p:cNvSpPr>
@@ -1648,8 +1667,8 @@
         </p:nvSpPr>
         <p:spPr>
           <a:xfrm>
-            <a:off x="5228216" y="3537507"/>
-            <a:ext cx="6347012" cy="2271657"/>
+            <a:off x="1450490" y="613204"/>
+            <a:ext cx="9144000" cy="1280142"/>
           </a:xfrm>
           <a:prstGeom prst="rect">
             <a:avLst/>
@@ -1657,7 +1676,7 @@
         </p:spPr>
         <p:txBody>
           <a:bodyPr vert="horz" lIns="91440" tIns="45720" rIns="91440" bIns="45720" rtlCol="0">
-            <a:noAutofit/>
+            <a:normAutofit/>
           </a:bodyPr>
           <a:lstStyle>
             <a:lvl1pPr marL="0" indent="0" algn="ctr" defTabSz="914400" rtl="0" eaLnBrk="1" latinLnBrk="0" hangingPunct="1">
@@ -1824,53 +1843,7 @@
             </a:lvl9pPr>
           </a:lstStyle>
           <a:p>
-            <a:r>
-              <a:rPr lang="pt-BR" sz="1800" dirty="0" smtClean="0"/>
-              <a:t>Responda:</a:t>
-            </a:r>
-          </a:p>
-          <a:p>
-            <a:r>
-              <a:rPr lang="pt-BR" sz="1800" dirty="0" smtClean="0"/>
-              <a:t>Qual unidade que mais gasta?</a:t>
-            </a:r>
-          </a:p>
-          <a:p>
-            <a:r>
-              <a:rPr lang="pt-BR" sz="1800" dirty="0" smtClean="0"/>
-              <a:t>Qual o gasto total da empresa?</a:t>
-            </a:r>
-          </a:p>
-          <a:p>
-            <a:r>
-              <a:rPr lang="pt-BR" sz="1800" dirty="0" smtClean="0"/>
-              <a:t>Qual a conta que mais gasta?</a:t>
-            </a:r>
-          </a:p>
-          <a:p>
-            <a:r>
-              <a:rPr lang="pt-BR" sz="1800" dirty="0" smtClean="0"/>
-              <a:t>Quanto representa em percentual o gasto de pessoal no total?</a:t>
-            </a:r>
-          </a:p>
-          <a:p>
-            <a:endParaRPr lang="pt-BR" sz="1800" dirty="0"/>
-          </a:p>
-          <a:p>
-            <a:r>
-              <a:rPr lang="pt-BR" sz="1800" dirty="0" smtClean="0"/>
-              <a:t>Dica: Formula 3d Soma, copia de planilhas, fórmula aritmética</a:t>
-            </a:r>
-          </a:p>
-          <a:p>
-            <a:endParaRPr lang="pt-BR" sz="1800" dirty="0" smtClean="0"/>
-          </a:p>
-          <a:p>
-            <a:r>
-              <a:rPr lang="pt-BR" sz="1800" dirty="0" smtClean="0"/>
-              <a:t> </a:t>
-            </a:r>
-            <a:endParaRPr lang="pt-BR" sz="1800" dirty="0"/>
+            <a:endParaRPr lang="pt-BR" dirty="0"/>
           </a:p>
         </p:txBody>
       </p:sp>
@@ -1885,7 +1858,7 @@
         <p:spPr>
           <a:xfrm>
             <a:off x="210670" y="153054"/>
-            <a:ext cx="10058400" cy="718315"/>
+            <a:ext cx="10058400" cy="1143000"/>
           </a:xfrm>
         </p:spPr>
         <p:txBody>
@@ -2061,49 +2034,30 @@
                 </a:solidFill>
                 <a:latin typeface="Corbel" panose="020B0503020204020204" pitchFamily="34" charset="0"/>
               </a:rPr>
-              <a:t>Atividade</a:t>
-            </a:r>
-          </a:p>
-        </p:txBody>
-      </p:sp>
-      <p:sp>
-        <p:nvSpPr>
-          <p:cNvPr id="7" name="CaixaDeTexto 6"/>
-          <p:cNvSpPr txBox="1"/>
-          <p:nvPr/>
-        </p:nvSpPr>
-        <p:spPr>
-          <a:xfrm>
-            <a:off x="8875059" y="344245"/>
-            <a:ext cx="1065007" cy="376517"/>
-          </a:xfrm>
-          <a:prstGeom prst="rect">
-            <a:avLst/>
-          </a:prstGeom>
-          <a:noFill/>
-        </p:spPr>
-        <p:txBody>
-          <a:bodyPr wrap="square" rtlCol="0">
-            <a:spAutoFit/>
-          </a:bodyPr>
-          <a:lstStyle/>
-          <a:p>
-            <a:r>
-              <a:rPr lang="pt-BR" dirty="0"/>
-              <a:t>3</a:t>
-            </a:r>
-            <a:r>
-              <a:rPr lang="pt-BR" dirty="0" smtClean="0"/>
-              <a:t>0 Min</a:t>
-            </a:r>
-            <a:endParaRPr lang="pt-BR" dirty="0"/>
+              <a:t>Retomando: ultima aula vimos</a:t>
+            </a:r>
+          </a:p>
+          <a:p>
+            <a:pPr>
+              <a:lnSpc>
+                <a:spcPct val="150000"/>
+              </a:lnSpc>
+            </a:pPr>
+            <a:endParaRPr lang="pt-BR" sz="2400" b="1" dirty="0">
+              <a:solidFill>
+                <a:schemeClr val="accent6">
+                  <a:lumMod val="75000"/>
+                </a:schemeClr>
+              </a:solidFill>
+              <a:latin typeface="Corbel" panose="020B0503020204020204" pitchFamily="34" charset="0"/>
+            </a:endParaRPr>
           </a:p>
         </p:txBody>
       </p:sp>
     </p:spTree>
     <p:extLst>
       <p:ext uri="{BB962C8B-B14F-4D97-AF65-F5344CB8AC3E}">
-        <p14:creationId xmlns:p14="http://schemas.microsoft.com/office/powerpoint/2010/main" val="3586806204"/>
+        <p14:creationId xmlns:p14="http://schemas.microsoft.com/office/powerpoint/2010/main" val="3126983067"/>
       </p:ext>
     </p:extLst>
   </p:cSld>
@@ -2139,7 +2093,143 @@
       </p:grpSpPr>
       <p:sp>
         <p:nvSpPr>
-          <p:cNvPr id="6" name="Subtítulo 2"/>
+          <p:cNvPr id="3" name="Subtítulo 1"/>
+          <p:cNvSpPr>
+            <a:spLocks noGrp="1"/>
+          </p:cNvSpPr>
+          <p:nvPr>
+            <p:ph type="subTitle" idx="4294967295"/>
+          </p:nvPr>
+        </p:nvSpPr>
+        <p:spPr>
+          <a:xfrm>
+            <a:off x="1096122" y="807851"/>
+            <a:ext cx="9966325" cy="5495925"/>
+          </a:xfrm>
+        </p:spPr>
+        <p:txBody>
+          <a:bodyPr>
+            <a:noAutofit/>
+          </a:bodyPr>
+          <a:lstStyle/>
+          <a:p>
+            <a:pPr marL="0" indent="0">
+              <a:buNone/>
+            </a:pPr>
+            <a:endParaRPr lang="pt-BR" sz="2000" dirty="0"/>
+          </a:p>
+          <a:p>
+            <a:r>
+              <a:rPr lang="pt-BR" sz="2000" dirty="0" smtClean="0"/>
+              <a:t>Permite modificar diversas planilhas ao mesmo tempo.</a:t>
+            </a:r>
+          </a:p>
+          <a:p>
+            <a:r>
+              <a:rPr lang="pt-BR" sz="2000" dirty="0" smtClean="0"/>
+              <a:t>Usar fórmulas para ler o conteúdo das planilhas sem precisar referenciá-las.</a:t>
+            </a:r>
+          </a:p>
+          <a:p>
+            <a:r>
+              <a:rPr lang="pt-BR" sz="2000" dirty="0" smtClean="0"/>
+              <a:t>Condição: as informações devem estar sempre no mesmo endereço em cada Planilha.</a:t>
+            </a:r>
+          </a:p>
+          <a:p>
+            <a:endParaRPr lang="pt-BR" sz="2000" dirty="0"/>
+          </a:p>
+          <a:p>
+            <a:pPr marL="0" indent="0">
+              <a:buNone/>
+            </a:pPr>
+            <a:r>
+              <a:rPr lang="pt-BR" sz="2000" dirty="0" smtClean="0"/>
+              <a:t>Ação:</a:t>
+            </a:r>
+          </a:p>
+          <a:p>
+            <a:r>
+              <a:rPr lang="pt-BR" sz="2000" dirty="0" smtClean="0"/>
+              <a:t>1 - Clicar na aba da planilha com o </a:t>
+            </a:r>
+            <a:r>
+              <a:rPr lang="pt-BR" sz="2000" dirty="0" err="1" smtClean="0"/>
+              <a:t>Crtl</a:t>
+            </a:r>
+            <a:r>
+              <a:rPr lang="pt-BR" sz="2000" dirty="0" smtClean="0"/>
+              <a:t> pressionado</a:t>
+            </a:r>
+          </a:p>
+          <a:p>
+            <a:r>
+              <a:rPr lang="pt-BR" sz="2000" dirty="0" smtClean="0"/>
+              <a:t>2-Selecionar a primeira planilha, segurar Shift e clicar na ultima</a:t>
+            </a:r>
+          </a:p>
+          <a:p>
+            <a:r>
+              <a:rPr lang="pt-BR" sz="2000" dirty="0" smtClean="0"/>
+              <a:t>3-Botão direito no nome da aba “Selecionar todas as abas”.</a:t>
+            </a:r>
+          </a:p>
+          <a:p>
+            <a:endParaRPr lang="pt-BR" sz="2000" dirty="0"/>
+          </a:p>
+          <a:p>
+            <a:pPr marL="0" indent="0">
+              <a:buNone/>
+            </a:pPr>
+            <a:r>
+              <a:rPr lang="pt-BR" sz="2000" dirty="0" smtClean="0"/>
+              <a:t>Fórmulas 3D;</a:t>
+            </a:r>
+          </a:p>
+          <a:p>
+            <a:r>
+              <a:rPr lang="pt-BR" sz="2000" dirty="0" smtClean="0"/>
+              <a:t>Digite a fórmula, Secione a primeira planilha, segure shift e clique na última, [</a:t>
+            </a:r>
+            <a:r>
+              <a:rPr lang="pt-BR" sz="2000" dirty="0" err="1" smtClean="0"/>
+              <a:t>Enter</a:t>
+            </a:r>
+            <a:r>
+              <a:rPr lang="pt-BR" sz="2000" dirty="0" smtClean="0"/>
+              <a:t>]</a:t>
+            </a:r>
+          </a:p>
+          <a:p>
+            <a:r>
+              <a:rPr lang="pt-BR" sz="2000" dirty="0"/>
+              <a:t>=SOMA</a:t>
+            </a:r>
+            <a:r>
+              <a:rPr lang="pt-BR" sz="2000" dirty="0" smtClean="0"/>
+              <a:t>('Planilha1:Planilha4'!</a:t>
+            </a:r>
+            <a:r>
+              <a:rPr lang="pt-BR" sz="2000" dirty="0"/>
+              <a:t>D34)</a:t>
+            </a:r>
+            <a:endParaRPr lang="pt-BR" sz="2000" dirty="0" smtClean="0"/>
+          </a:p>
+          <a:p>
+            <a:pPr marL="0" indent="0">
+              <a:buNone/>
+            </a:pPr>
+            <a:r>
+              <a:rPr lang="pt-BR" sz="2000" dirty="0" smtClean="0"/>
+              <a:t> </a:t>
+            </a:r>
+            <a:endParaRPr lang="pt-BR" sz="2000" dirty="0"/>
+          </a:p>
+        </p:txBody>
+      </p:sp>
+      <p:sp>
+        <p:nvSpPr>
+          <p:cNvPr id="4" name="Subtítulo 2"/>
           <p:cNvSpPr txBox="1">
             <a:spLocks/>
           </p:cNvSpPr>
@@ -2148,7 +2238,7 @@
         <p:spPr>
           <a:xfrm>
             <a:off x="210670" y="153054"/>
-            <a:ext cx="10058400" cy="718315"/>
+            <a:ext cx="11364558" cy="718315"/>
           </a:xfrm>
         </p:spPr>
         <p:txBody>
@@ -2324,205 +2414,65 @@
                 </a:solidFill>
                 <a:latin typeface="Corbel" panose="020B0503020204020204" pitchFamily="34" charset="0"/>
               </a:rPr>
-              <a:t>Atividade</a:t>
+              <a:t>Para RELEMBRAR &gt; Fórmulas e ações Tridimensionais e trabalho com Planilha</a:t>
             </a:r>
           </a:p>
         </p:txBody>
       </p:sp>
       <p:sp>
         <p:nvSpPr>
-          <p:cNvPr id="11" name="Subtítulo 1"/>
-          <p:cNvSpPr txBox="1">
-            <a:spLocks/>
-          </p:cNvSpPr>
+          <p:cNvPr id="5" name="Elipse 4"/>
+          <p:cNvSpPr/>
           <p:nvPr/>
         </p:nvSpPr>
         <p:spPr>
           <a:xfrm>
-            <a:off x="692971" y="1913794"/>
-            <a:ext cx="10896600" cy="2817812"/>
+            <a:off x="10682344" y="5884433"/>
+            <a:ext cx="602428" cy="516367"/>
           </a:xfrm>
+          <a:prstGeom prst="ellipse">
+            <a:avLst/>
+          </a:prstGeom>
+          <a:solidFill>
+            <a:srgbClr val="92D050"/>
+          </a:solidFill>
+          <a:ln>
+            <a:noFill/>
+          </a:ln>
         </p:spPr>
+        <p:style>
+          <a:lnRef idx="2">
+            <a:schemeClr val="accent1">
+              <a:shade val="50000"/>
+            </a:schemeClr>
+          </a:lnRef>
+          <a:fillRef idx="1">
+            <a:schemeClr val="accent1"/>
+          </a:fillRef>
+          <a:effectRef idx="0">
+            <a:schemeClr val="accent1"/>
+          </a:effectRef>
+          <a:fontRef idx="minor">
+            <a:schemeClr val="lt1"/>
+          </a:fontRef>
+        </p:style>
         <p:txBody>
-          <a:bodyPr>
-            <a:noAutofit/>
-          </a:bodyPr>
-          <a:lstStyle>
-            <a:lvl1pPr marL="342900" indent="-342900" algn="l" rtl="0" eaLnBrk="0" fontAlgn="base" hangingPunct="0">
-              <a:spcBef>
-                <a:spcPct val="20000"/>
-              </a:spcBef>
-              <a:spcAft>
-                <a:spcPct val="0"/>
-              </a:spcAft>
-              <a:buFont typeface="Arial" charset="0"/>
-              <a:buChar char="•"/>
-              <a:defRPr lang="pt-BR" sz="2800" kern="1200" dirty="0">
-                <a:solidFill>
-                  <a:schemeClr val="tx1"/>
-                </a:solidFill>
-                <a:latin typeface="+mn-lt"/>
-                <a:ea typeface="+mn-ea"/>
-                <a:cs typeface="+mn-cs"/>
-              </a:defRPr>
-            </a:lvl1pPr>
-            <a:lvl2pPr marL="742950" indent="-285750" algn="l" rtl="0" eaLnBrk="0" fontAlgn="base" hangingPunct="0">
-              <a:spcBef>
-                <a:spcPct val="20000"/>
-              </a:spcBef>
-              <a:spcAft>
-                <a:spcPct val="0"/>
-              </a:spcAft>
-              <a:buFont typeface="Arial" charset="0"/>
-              <a:buChar char="•"/>
-              <a:defRPr lang="pt-BR" sz="2400" kern="1200" dirty="0">
-                <a:solidFill>
-                  <a:schemeClr val="tx1"/>
-                </a:solidFill>
-                <a:latin typeface="+mn-lt"/>
-                <a:ea typeface="+mn-ea"/>
-                <a:cs typeface="+mn-cs"/>
-              </a:defRPr>
-            </a:lvl2pPr>
-            <a:lvl3pPr marL="1143000" indent="-228600" algn="l" rtl="0" eaLnBrk="0" fontAlgn="base" hangingPunct="0">
-              <a:spcBef>
-                <a:spcPct val="20000"/>
-              </a:spcBef>
-              <a:spcAft>
-                <a:spcPct val="0"/>
-              </a:spcAft>
-              <a:buFont typeface="Arial" charset="0"/>
-              <a:buChar char="•"/>
-              <a:defRPr lang="pt-BR" sz="2400" kern="1200" dirty="0">
-                <a:solidFill>
-                  <a:schemeClr val="tx1"/>
-                </a:solidFill>
-                <a:latin typeface="+mn-lt"/>
-                <a:ea typeface="+mn-ea"/>
-                <a:cs typeface="+mn-cs"/>
-              </a:defRPr>
-            </a:lvl3pPr>
-            <a:lvl4pPr marL="1600200" indent="-228600" algn="l" rtl="0" eaLnBrk="0" fontAlgn="base" hangingPunct="0">
-              <a:spcBef>
-                <a:spcPct val="20000"/>
-              </a:spcBef>
-              <a:spcAft>
-                <a:spcPct val="0"/>
-              </a:spcAft>
-              <a:buFont typeface="Arial" charset="0"/>
-              <a:buChar char="•"/>
-              <a:defRPr lang="pt-BR" sz="2000" kern="1200" dirty="0">
-                <a:solidFill>
-                  <a:schemeClr val="tx1"/>
-                </a:solidFill>
-                <a:latin typeface="+mn-lt"/>
-                <a:ea typeface="+mn-ea"/>
-                <a:cs typeface="+mn-cs"/>
-              </a:defRPr>
-            </a:lvl4pPr>
-            <a:lvl5pPr marL="2057400" indent="-228600" algn="l" rtl="0" eaLnBrk="0" fontAlgn="base" hangingPunct="0">
-              <a:spcBef>
-                <a:spcPct val="20000"/>
-              </a:spcBef>
-              <a:spcAft>
-                <a:spcPct val="0"/>
-              </a:spcAft>
-              <a:buFont typeface="Arial" charset="0"/>
-              <a:buChar char="•"/>
-              <a:defRPr lang="pt-BR" sz="2000" kern="1200" dirty="0">
-                <a:solidFill>
-                  <a:schemeClr val="tx1"/>
-                </a:solidFill>
-                <a:latin typeface="+mn-lt"/>
-                <a:ea typeface="+mn-ea"/>
-                <a:cs typeface="+mn-cs"/>
-              </a:defRPr>
-            </a:lvl5pPr>
-            <a:lvl6pPr marL="2514600" indent="-228600" algn="l" defTabSz="914400" rtl="0" eaLnBrk="1" latinLnBrk="0" hangingPunct="1">
-              <a:spcBef>
-                <a:spcPct val="20000"/>
-              </a:spcBef>
-              <a:buFont typeface="Arial" pitchFamily="34" charset="0"/>
-              <a:buChar char="•"/>
-              <a:defRPr sz="2000" kern="1200">
-                <a:solidFill>
-                  <a:schemeClr val="tx1"/>
-                </a:solidFill>
-                <a:latin typeface="+mn-lt"/>
-                <a:ea typeface="+mn-ea"/>
-                <a:cs typeface="+mn-cs"/>
-              </a:defRPr>
-            </a:lvl6pPr>
-            <a:lvl7pPr marL="2971800" indent="-228600" algn="l" defTabSz="914400" rtl="0" eaLnBrk="1" latinLnBrk="0" hangingPunct="1">
-              <a:spcBef>
-                <a:spcPct val="20000"/>
-              </a:spcBef>
-              <a:buFont typeface="Arial" pitchFamily="34" charset="0"/>
-              <a:buChar char="•"/>
-              <a:defRPr sz="2000" kern="1200">
-                <a:solidFill>
-                  <a:schemeClr val="tx1"/>
-                </a:solidFill>
-                <a:latin typeface="+mn-lt"/>
-                <a:ea typeface="+mn-ea"/>
-                <a:cs typeface="+mn-cs"/>
-              </a:defRPr>
-            </a:lvl7pPr>
-            <a:lvl8pPr marL="3429000" indent="-228600" algn="l" defTabSz="914400" rtl="0" eaLnBrk="1" latinLnBrk="0" hangingPunct="1">
-              <a:spcBef>
-                <a:spcPct val="20000"/>
-              </a:spcBef>
-              <a:buFont typeface="Arial" pitchFamily="34" charset="0"/>
-              <a:buChar char="•"/>
-              <a:defRPr sz="2000" kern="1200">
-                <a:solidFill>
-                  <a:schemeClr val="tx1"/>
-                </a:solidFill>
-                <a:latin typeface="+mn-lt"/>
-                <a:ea typeface="+mn-ea"/>
-                <a:cs typeface="+mn-cs"/>
-              </a:defRPr>
-            </a:lvl8pPr>
-            <a:lvl9pPr marL="3886200" indent="-228600" algn="l" defTabSz="914400" rtl="0" eaLnBrk="1" latinLnBrk="0" hangingPunct="1">
-              <a:spcBef>
-                <a:spcPct val="20000"/>
-              </a:spcBef>
-              <a:buFont typeface="Arial" pitchFamily="34" charset="0"/>
-              <a:buChar char="•"/>
-              <a:defRPr sz="2000" kern="1200">
-                <a:solidFill>
-                  <a:schemeClr val="tx1"/>
-                </a:solidFill>
-                <a:latin typeface="+mn-lt"/>
-                <a:ea typeface="+mn-ea"/>
-                <a:cs typeface="+mn-cs"/>
-              </a:defRPr>
-            </a:lvl9pPr>
-          </a:lstStyle>
-          <a:p>
-            <a:pPr marL="0" indent="0">
-              <a:buNone/>
-            </a:pPr>
-            <a:r>
-              <a:rPr lang="pt-BR" sz="1800" dirty="0" smtClean="0"/>
-              <a:t>Usar material </a:t>
-            </a:r>
-            <a:r>
-              <a:rPr lang="pt-BR" sz="1800" b="1" i="1" u="sng" dirty="0" err="1"/>
-              <a:t>Ex</a:t>
-            </a:r>
-            <a:r>
-              <a:rPr lang="pt-BR" sz="1800" b="1" i="1" u="sng" dirty="0"/>
-              <a:t> PROVC.xlsx</a:t>
-            </a:r>
-            <a:endParaRPr lang="pt-BR" sz="1800" b="1" i="1" u="sng" dirty="0" smtClean="0"/>
+          <a:bodyPr rtlCol="0" anchor="ctr"/>
+          <a:lstStyle/>
+          <a:p>
+            <a:pPr algn="ctr"/>
+            <a:r>
+              <a:rPr lang="pt-BR" dirty="0" smtClean="0"/>
+              <a:t>45</a:t>
+            </a:r>
+            <a:endParaRPr lang="pt-BR" dirty="0"/>
           </a:p>
         </p:txBody>
       </p:sp>
     </p:spTree>
     <p:extLst>
       <p:ext uri="{BB962C8B-B14F-4D97-AF65-F5344CB8AC3E}">
-        <p14:creationId xmlns:p14="http://schemas.microsoft.com/office/powerpoint/2010/main" val="4064935075"/>
+        <p14:creationId xmlns:p14="http://schemas.microsoft.com/office/powerpoint/2010/main" val="1267708039"/>
       </p:ext>
     </p:extLst>
   </p:cSld>
@@ -2743,14 +2693,14 @@
                 </a:solidFill>
                 <a:latin typeface="Corbel" panose="020B0503020204020204" pitchFamily="34" charset="0"/>
               </a:rPr>
-              <a:t>Atividade</a:t>
+              <a:t>Comandos com Listas -  Classificar</a:t>
             </a:r>
           </a:p>
         </p:txBody>
       </p:sp>
       <p:sp>
         <p:nvSpPr>
-          <p:cNvPr id="4" name="Subtítulo 1"/>
+          <p:cNvPr id="11" name="Subtítulo 1"/>
           <p:cNvSpPr txBox="1">
             <a:spLocks/>
           </p:cNvSpPr>
@@ -2758,7 +2708,7 @@
         </p:nvSpPr>
         <p:spPr>
           <a:xfrm>
-            <a:off x="327211" y="988637"/>
+            <a:off x="391757" y="871369"/>
             <a:ext cx="10896600" cy="2817812"/>
           </a:xfrm>
         </p:spPr>
@@ -2920,48 +2870,44 @@
           </a:lstStyle>
           <a:p>
             <a:pPr marL="0" indent="0">
+              <a:buFont typeface="Arial" charset="0"/>
               <a:buNone/>
             </a:pPr>
             <a:r>
-              <a:rPr lang="pt-BR" sz="1800" dirty="0" smtClean="0">
+              <a:rPr lang="pt-BR" sz="1600" dirty="0" smtClean="0">
                 <a:latin typeface="Corbel" panose="020B0503020204020204" pitchFamily="34" charset="0"/>
               </a:rPr>
-              <a:t>Você recebeu uma base de dados sobre as despesas da Empresa em </a:t>
-            </a:r>
-            <a:r>
-              <a:rPr lang="pt-BR" sz="1800" dirty="0" err="1" smtClean="0">
+              <a:t>O Excel Permite Classificar as listas (linhas e também </a:t>
+            </a:r>
+            <a:r>
+              <a:rPr lang="pt-BR" sz="1600" dirty="0" smtClean="0">
                 <a:latin typeface="Corbel" panose="020B0503020204020204" pitchFamily="34" charset="0"/>
               </a:rPr>
-              <a:t>txt</a:t>
-            </a:r>
-            <a:r>
-              <a:rPr lang="pt-BR" sz="1800" dirty="0" smtClean="0">
+              <a:t>colunas [fig2]) </a:t>
+            </a:r>
+            <a:r>
+              <a:rPr lang="pt-BR" sz="1600" dirty="0" smtClean="0">
                 <a:latin typeface="Corbel" panose="020B0503020204020204" pitchFamily="34" charset="0"/>
               </a:rPr>
-              <a:t> extraída do sistema ERP de um relatório da contabilidade que não possui campos de descrição do Diretor responsável (arquivo Fornecedores.txt). </a:t>
-            </a:r>
-          </a:p>
-          <a:p>
-            <a:pPr marL="0" indent="0">
-              <a:buNone/>
-            </a:pPr>
-            <a:r>
-              <a:rPr lang="pt-BR" sz="1800" dirty="0" smtClean="0">
+              <a:t>automaticamente de acordo com regras pré-estabelecidas (ordem numérica ou ordem alfabética) </a:t>
+            </a:r>
+            <a:r>
+              <a:rPr lang="pt-BR" sz="1600" dirty="0" smtClean="0">
                 <a:latin typeface="Corbel" panose="020B0503020204020204" pitchFamily="34" charset="0"/>
               </a:rPr>
-              <a:t>Cada linha/registro  representa uma nota de pagamento</a:t>
-            </a:r>
-          </a:p>
-          <a:p>
-            <a:pPr marL="0" indent="0">
-              <a:buFont typeface="Arial" charset="0"/>
-              <a:buNone/>
-            </a:pPr>
-            <a:r>
-              <a:rPr lang="pt-BR" sz="1800" dirty="0" smtClean="0">
+              <a:t>em diversos níveis de classificação tanto crescente quando </a:t>
+            </a:r>
+            <a:r>
+              <a:rPr lang="pt-BR" sz="1600" dirty="0" err="1" smtClean="0">
                 <a:latin typeface="Corbel" panose="020B0503020204020204" pitchFamily="34" charset="0"/>
               </a:rPr>
-              <a:t>Nem todos os registro possuem nome do gerente ou centro de custo.</a:t>
+              <a:t>descrescente</a:t>
+            </a:r>
+            <a:r>
+              <a:rPr lang="pt-BR" sz="1600" dirty="0" smtClean="0">
+                <a:latin typeface="Corbel" panose="020B0503020204020204" pitchFamily="34" charset="0"/>
+              </a:rPr>
+              <a:t>.</a:t>
             </a:r>
           </a:p>
           <a:p>
@@ -2969,225 +2915,360 @@
               <a:buFont typeface="Arial" charset="0"/>
               <a:buNone/>
             </a:pPr>
-            <a:endParaRPr lang="pt-BR" sz="1800" dirty="0" smtClean="0">
+            <a:r>
+              <a:rPr lang="pt-BR" sz="1600" dirty="0" smtClean="0">
+                <a:latin typeface="Corbel" panose="020B0503020204020204" pitchFamily="34" charset="0"/>
+              </a:rPr>
+              <a:t>EX&gt; Classificar alfabeticamente pelo </a:t>
+            </a:r>
+            <a:r>
+              <a:rPr lang="pt-BR" sz="1600" b="1" u="sng" dirty="0" smtClean="0">
+                <a:latin typeface="Corbel" panose="020B0503020204020204" pitchFamily="34" charset="0"/>
+              </a:rPr>
+              <a:t>Nome de Um pais </a:t>
+            </a:r>
+            <a:r>
+              <a:rPr lang="pt-BR" sz="1600" dirty="0" smtClean="0">
+                <a:latin typeface="Corbel" panose="020B0503020204020204" pitchFamily="34" charset="0"/>
+              </a:rPr>
+              <a:t>e depois </a:t>
+            </a:r>
+            <a:r>
+              <a:rPr lang="pt-BR" sz="1600" b="1" u="sng" dirty="0" smtClean="0">
+                <a:latin typeface="Corbel" panose="020B0503020204020204" pitchFamily="34" charset="0"/>
+              </a:rPr>
+              <a:t>pelo Estado</a:t>
+            </a:r>
+            <a:r>
+              <a:rPr lang="pt-BR" sz="1600" dirty="0" smtClean="0">
+                <a:latin typeface="Corbel" panose="020B0503020204020204" pitchFamily="34" charset="0"/>
+              </a:rPr>
+              <a:t>: 2 níveis (fig1).</a:t>
+            </a:r>
+            <a:endParaRPr lang="pt-BR" sz="1600" dirty="0" smtClean="0">
               <a:latin typeface="Corbel" panose="020B0503020204020204" pitchFamily="34" charset="0"/>
             </a:endParaRPr>
           </a:p>
           <a:p>
             <a:pPr marL="0" indent="0">
+              <a:buFont typeface="Arial" charset="0"/>
               <a:buNone/>
             </a:pPr>
-            <a:r>
-              <a:rPr lang="pt-BR" sz="1800" dirty="0" smtClean="0">
+            <a:endParaRPr lang="pt-BR" sz="1600" dirty="0">
+              <a:latin typeface="Corbel" panose="020B0503020204020204" pitchFamily="34" charset="0"/>
+            </a:endParaRPr>
+          </a:p>
+          <a:p>
+            <a:pPr marL="0" indent="0">
+              <a:buFont typeface="Arial" charset="0"/>
+              <a:buNone/>
+            </a:pPr>
+            <a:r>
+              <a:rPr lang="pt-BR" sz="1600" dirty="0" smtClean="0">
                 <a:latin typeface="Corbel" panose="020B0503020204020204" pitchFamily="34" charset="0"/>
               </a:rPr>
-              <a:t>Cruze este banco de dados com o cadastro de outro </a:t>
-            </a:r>
-            <a:r>
-              <a:rPr lang="pt-BR" sz="1800" dirty="0">
+              <a:t>Listas nativas do Excel são aquelas já instaladas com o programa : dias da semana, nome do mês</a:t>
+            </a:r>
+          </a:p>
+          <a:p>
+            <a:pPr marL="0" indent="0">
+              <a:buFont typeface="Arial" charset="0"/>
+              <a:buNone/>
+            </a:pPr>
+            <a:r>
+              <a:rPr lang="pt-BR" sz="1600" dirty="0" smtClean="0">
                 <a:latin typeface="Corbel" panose="020B0503020204020204" pitchFamily="34" charset="0"/>
               </a:rPr>
-              <a:t>sistema (De para </a:t>
-            </a:r>
-            <a:r>
-              <a:rPr lang="pt-BR" sz="1800" dirty="0" err="1">
+              <a:t>Listas personalizadas: qualquer uma criada pelo próprio usuário</a:t>
+            </a:r>
+            <a:r>
+              <a:rPr lang="pt-BR" sz="1600" dirty="0" smtClean="0">
                 <a:latin typeface="Corbel" panose="020B0503020204020204" pitchFamily="34" charset="0"/>
               </a:rPr>
-              <a:t>CCusto</a:t>
-            </a:r>
-            <a:r>
-              <a:rPr lang="pt-BR" sz="1800" dirty="0">
+              <a:t>.</a:t>
+            </a:r>
+            <a:endParaRPr lang="pt-BR" sz="1600" dirty="0" smtClean="0">
+              <a:latin typeface="Corbel" panose="020B0503020204020204" pitchFamily="34" charset="0"/>
+            </a:endParaRPr>
+          </a:p>
+          <a:p>
+            <a:pPr marL="0" indent="0">
+              <a:buFont typeface="Arial" charset="0"/>
+              <a:buNone/>
+            </a:pPr>
+            <a:endParaRPr lang="pt-BR" sz="1600" dirty="0">
+              <a:latin typeface="Corbel" panose="020B0503020204020204" pitchFamily="34" charset="0"/>
+            </a:endParaRPr>
+          </a:p>
+          <a:p>
+            <a:pPr marL="0" indent="0">
+              <a:buFont typeface="Arial" charset="0"/>
+              <a:buNone/>
+            </a:pPr>
+            <a:r>
+              <a:rPr lang="pt-BR" sz="1600" dirty="0" smtClean="0">
                 <a:latin typeface="Corbel" panose="020B0503020204020204" pitchFamily="34" charset="0"/>
               </a:rPr>
-              <a:t> X </a:t>
-            </a:r>
-            <a:r>
-              <a:rPr lang="pt-BR" sz="1800" dirty="0" smtClean="0">
+              <a:t>Caminho:</a:t>
+            </a:r>
+          </a:p>
+          <a:p>
+            <a:pPr marL="0" indent="0">
+              <a:buFont typeface="Arial" charset="0"/>
+              <a:buNone/>
+            </a:pPr>
+            <a:r>
+              <a:rPr lang="pt-BR" sz="1600" dirty="0" smtClean="0">
                 <a:latin typeface="Corbel" panose="020B0503020204020204" pitchFamily="34" charset="0"/>
               </a:rPr>
-              <a:t>Fornecedores.xlsx) e descubra:</a:t>
-            </a:r>
-          </a:p>
-          <a:p>
-            <a:pPr marL="0" indent="0">
-              <a:buFont typeface="Arial" charset="0"/>
-              <a:buNone/>
-            </a:pPr>
-            <a:endParaRPr lang="pt-BR" sz="1800" dirty="0">
+              <a:t>Fazer ordenação: Selecionar intervalo, Guia Dados, grupo classificar e Filtrar, comando </a:t>
+            </a:r>
+            <a:r>
+              <a:rPr lang="pt-BR" sz="1600" dirty="0" smtClean="0">
+                <a:latin typeface="Corbel" panose="020B0503020204020204" pitchFamily="34" charset="0"/>
+              </a:rPr>
+              <a:t>classificar (permite +1 nível de classificação) </a:t>
+            </a:r>
+            <a:r>
+              <a:rPr lang="pt-BR" sz="1600" b="1" u="sng" dirty="0" smtClean="0">
+                <a:effectLst>
+                  <a:outerShdw blurRad="38100" dist="38100" dir="2700000" algn="tl">
+                    <a:srgbClr val="000000">
+                      <a:alpha val="43137"/>
+                    </a:srgbClr>
+                  </a:outerShdw>
+                </a:effectLst>
+                <a:latin typeface="Corbel" panose="020B0503020204020204" pitchFamily="34" charset="0"/>
+              </a:rPr>
+              <a:t>OU</a:t>
+            </a:r>
+            <a:r>
+              <a:rPr lang="pt-BR" sz="1600" dirty="0" smtClean="0">
+                <a:latin typeface="Corbel" panose="020B0503020204020204" pitchFamily="34" charset="0"/>
+              </a:rPr>
+              <a:t> </a:t>
+            </a:r>
+            <a:r>
+              <a:rPr lang="pt-BR" sz="1600" dirty="0" smtClean="0">
+                <a:latin typeface="Corbel" panose="020B0503020204020204" pitchFamily="34" charset="0"/>
+              </a:rPr>
+              <a:t>Botão direito na coluna que quer usar como referencia&gt; Classificar</a:t>
+            </a:r>
+            <a:r>
+              <a:rPr lang="pt-BR" sz="1600" dirty="0" smtClean="0">
+                <a:latin typeface="Corbel" panose="020B0503020204020204" pitchFamily="34" charset="0"/>
+              </a:rPr>
+              <a:t>. (somente 1 nível de classificação)</a:t>
+            </a:r>
+            <a:endParaRPr lang="pt-BR" sz="1600" dirty="0" smtClean="0">
               <a:latin typeface="Corbel" panose="020B0503020204020204" pitchFamily="34" charset="0"/>
             </a:endParaRPr>
           </a:p>
           <a:p>
             <a:pPr marL="0" indent="0">
+              <a:buFont typeface="Arial" charset="0"/>
               <a:buNone/>
             </a:pPr>
-            <a:endParaRPr lang="pt-BR" sz="1800" dirty="0" smtClean="0">
+            <a:endParaRPr lang="pt-BR" sz="1600" dirty="0" smtClean="0">
               <a:latin typeface="Corbel" panose="020B0503020204020204" pitchFamily="34" charset="0"/>
             </a:endParaRPr>
           </a:p>
-          <a:p>
-            <a:pPr>
-              <a:buFont typeface="Arial" panose="020B0604020202020204" pitchFamily="34" charset="0"/>
-              <a:buChar char="•"/>
-            </a:pPr>
-            <a:r>
-              <a:rPr lang="pt-BR" sz="1800" dirty="0" smtClean="0">
-                <a:latin typeface="Corbel" panose="020B0503020204020204" pitchFamily="34" charset="0"/>
-              </a:rPr>
-              <a:t>Qual o valor gasto total da empresa com “MATERIAL </a:t>
-            </a:r>
-            <a:r>
-              <a:rPr lang="pt-BR" sz="1800" dirty="0">
-                <a:latin typeface="Corbel" panose="020B0503020204020204" pitchFamily="34" charset="0"/>
-              </a:rPr>
-              <a:t>IMPRESSO </a:t>
-            </a:r>
-            <a:r>
-              <a:rPr lang="pt-BR" sz="1800" dirty="0" smtClean="0">
-                <a:latin typeface="Corbel" panose="020B0503020204020204" pitchFamily="34" charset="0"/>
-              </a:rPr>
-              <a:t>FÁBRICA”?</a:t>
-            </a:r>
-          </a:p>
-          <a:p>
-            <a:pPr>
-              <a:buFont typeface="Arial" panose="020B0604020202020204" pitchFamily="34" charset="0"/>
-              <a:buChar char="•"/>
-            </a:pPr>
-            <a:r>
-              <a:rPr lang="pt-BR" sz="1800" dirty="0" smtClean="0">
-                <a:latin typeface="Corbel" panose="020B0503020204020204" pitchFamily="34" charset="0"/>
-              </a:rPr>
-              <a:t>Qual o gasto total do Diretor Silvio (para centros de custo identificados</a:t>
-            </a:r>
-            <a:r>
-              <a:rPr lang="pt-BR" sz="1800" dirty="0" smtClean="0">
-                <a:latin typeface="Corbel" panose="020B0503020204020204" pitchFamily="34" charset="0"/>
-              </a:rPr>
-              <a:t>)?</a:t>
-            </a:r>
-          </a:p>
-          <a:p>
-            <a:pPr>
-              <a:buFont typeface="Arial" panose="020B0604020202020204" pitchFamily="34" charset="0"/>
-              <a:buChar char="•"/>
-            </a:pPr>
-            <a:r>
-              <a:rPr lang="pt-BR" sz="1800" dirty="0" smtClean="0">
-                <a:latin typeface="Corbel" panose="020B0503020204020204" pitchFamily="34" charset="0"/>
-              </a:rPr>
-              <a:t>Qual o gasto de todos os departamentos de ATENDIMENTO?</a:t>
-            </a:r>
-            <a:endParaRPr lang="pt-BR" sz="1800" dirty="0" smtClean="0">
-              <a:latin typeface="Corbel" panose="020B0503020204020204" pitchFamily="34" charset="0"/>
-            </a:endParaRPr>
-          </a:p>
-          <a:p>
-            <a:pPr>
-              <a:buFont typeface="Arial" panose="020B0604020202020204" pitchFamily="34" charset="0"/>
-              <a:buChar char="•"/>
-            </a:pPr>
-            <a:r>
-              <a:rPr lang="pt-BR" sz="1800" dirty="0" smtClean="0">
-                <a:latin typeface="Corbel" panose="020B0503020204020204" pitchFamily="34" charset="0"/>
-              </a:rPr>
-              <a:t>Quais os dados (responsável, fornecedor, diretor)  da NOTA de maior valor?</a:t>
-            </a:r>
-          </a:p>
-          <a:p>
-            <a:pPr>
-              <a:buFont typeface="Arial" panose="020B0604020202020204" pitchFamily="34" charset="0"/>
-              <a:buChar char="•"/>
-            </a:pPr>
-            <a:endParaRPr lang="pt-BR" sz="1800" dirty="0">
-              <a:latin typeface="Corbel" panose="020B0503020204020204" pitchFamily="34" charset="0"/>
-            </a:endParaRPr>
-          </a:p>
-          <a:p>
-            <a:pPr>
-              <a:buFont typeface="Arial" panose="020B0604020202020204" pitchFamily="34" charset="0"/>
-              <a:buChar char="•"/>
-            </a:pPr>
-            <a:endParaRPr lang="pt-BR" sz="1800" dirty="0" smtClean="0">
-              <a:latin typeface="Corbel" panose="020B0503020204020204" pitchFamily="34" charset="0"/>
-            </a:endParaRPr>
-          </a:p>
-          <a:p>
-            <a:pPr>
-              <a:buFont typeface="Arial" panose="020B0604020202020204" pitchFamily="34" charset="0"/>
-              <a:buChar char="•"/>
-            </a:pPr>
-            <a:endParaRPr lang="pt-BR" sz="1800" dirty="0">
-              <a:latin typeface="Corbel" panose="020B0503020204020204" pitchFamily="34" charset="0"/>
-            </a:endParaRPr>
-          </a:p>
-          <a:p>
-            <a:pPr marL="0" indent="0">
-              <a:buNone/>
-            </a:pPr>
-            <a:r>
-              <a:rPr lang="pt-BR" sz="1800" dirty="0" smtClean="0">
-                <a:latin typeface="Corbel" panose="020B0503020204020204" pitchFamily="34" charset="0"/>
-              </a:rPr>
-              <a:t>Dica: Converter Todos os IDS para numero, PROCV, Texto para Coluna, FILTRO, Classificação.</a:t>
-            </a:r>
-          </a:p>
-          <a:p>
-            <a:pPr marL="0" indent="0">
-              <a:buNone/>
-            </a:pPr>
-            <a:endParaRPr lang="pt-BR" sz="1800" dirty="0" smtClean="0">
-              <a:latin typeface="Corbel" panose="020B0503020204020204" pitchFamily="34" charset="0"/>
-            </a:endParaRPr>
-          </a:p>
-          <a:p>
-            <a:pPr marL="0" indent="0">
-              <a:buNone/>
-            </a:pPr>
-            <a:endParaRPr lang="pt-BR" sz="1800" dirty="0" smtClean="0">
-              <a:latin typeface="Corbel" panose="020B0503020204020204" pitchFamily="34" charset="0"/>
-            </a:endParaRPr>
-          </a:p>
-          <a:p>
-            <a:pPr marL="0" indent="0">
-              <a:buNone/>
-            </a:pPr>
-            <a:endParaRPr lang="pt-BR" sz="1800" dirty="0" smtClean="0">
-              <a:latin typeface="Corbel" panose="020B0503020204020204" pitchFamily="34" charset="0"/>
-            </a:endParaRPr>
-          </a:p>
-          <a:p>
-            <a:pPr marL="0" indent="0">
-              <a:buNone/>
-            </a:pPr>
-            <a:endParaRPr lang="pt-BR" sz="1800" dirty="0" smtClean="0">
-              <a:latin typeface="Corbel" panose="020B0503020204020204" pitchFamily="34" charset="0"/>
-            </a:endParaRPr>
-          </a:p>
-          <a:p>
-            <a:pPr marL="0" indent="0">
-              <a:buFont typeface="Arial" charset="0"/>
-              <a:buNone/>
-            </a:pPr>
-            <a:endParaRPr lang="pt-BR" sz="1800" dirty="0" smtClean="0">
-              <a:latin typeface="Corbel" panose="020B0503020204020204" pitchFamily="34" charset="0"/>
-            </a:endParaRPr>
-          </a:p>
-          <a:p>
-            <a:pPr marL="0" indent="0">
-              <a:buFont typeface="Arial" charset="0"/>
-              <a:buNone/>
-            </a:pPr>
-            <a:endParaRPr lang="pt-BR" sz="1800" dirty="0" smtClean="0">
-              <a:latin typeface="Corbel" panose="020B0503020204020204" pitchFamily="34" charset="0"/>
-            </a:endParaRPr>
+        </p:txBody>
+      </p:sp>
+      <p:pic>
+        <p:nvPicPr>
+          <p:cNvPr id="2" name="Imagem 1"/>
+          <p:cNvPicPr>
+            <a:picLocks noChangeAspect="1"/>
+          </p:cNvPicPr>
+          <p:nvPr/>
+        </p:nvPicPr>
+        <p:blipFill>
+          <a:blip r:embed="rId2"/>
+          <a:stretch>
+            <a:fillRect/>
+          </a:stretch>
+        </p:blipFill>
+        <p:spPr>
+          <a:xfrm>
+            <a:off x="488576" y="3937411"/>
+            <a:ext cx="5223735" cy="2147275"/>
+          </a:xfrm>
+          <a:prstGeom prst="rect">
+            <a:avLst/>
+          </a:prstGeom>
+        </p:spPr>
+      </p:pic>
+      <p:sp>
+        <p:nvSpPr>
+          <p:cNvPr id="4" name="Elipse 3"/>
+          <p:cNvSpPr/>
+          <p:nvPr/>
+        </p:nvSpPr>
+        <p:spPr>
+          <a:xfrm>
+            <a:off x="3506993" y="4077148"/>
+            <a:ext cx="634701" cy="484094"/>
+          </a:xfrm>
+          <a:prstGeom prst="ellipse">
+            <a:avLst/>
+          </a:prstGeom>
+          <a:noFill/>
+          <a:ln>
+            <a:solidFill>
+              <a:srgbClr val="FF0000"/>
+            </a:solidFill>
+          </a:ln>
+        </p:spPr>
+        <p:style>
+          <a:lnRef idx="2">
+            <a:schemeClr val="accent1">
+              <a:shade val="50000"/>
+            </a:schemeClr>
+          </a:lnRef>
+          <a:fillRef idx="1">
+            <a:schemeClr val="accent1"/>
+          </a:fillRef>
+          <a:effectRef idx="0">
+            <a:schemeClr val="accent1"/>
+          </a:effectRef>
+          <a:fontRef idx="minor">
+            <a:schemeClr val="lt1"/>
+          </a:fontRef>
+        </p:style>
+        <p:txBody>
+          <a:bodyPr rtlCol="0" anchor="ctr"/>
+          <a:lstStyle/>
+          <a:p>
+            <a:pPr algn="ctr"/>
+            <a:endParaRPr lang="pt-BR"/>
+          </a:p>
+        </p:txBody>
+      </p:sp>
+      <p:cxnSp>
+        <p:nvCxnSpPr>
+          <p:cNvPr id="7" name="Conector de Seta Reta 6"/>
+          <p:cNvCxnSpPr/>
+          <p:nvPr/>
+        </p:nvCxnSpPr>
+        <p:spPr>
+          <a:xfrm>
+            <a:off x="4184725" y="4407496"/>
+            <a:ext cx="2883049" cy="351811"/>
+          </a:xfrm>
+          <a:prstGeom prst="straightConnector1">
+            <a:avLst/>
+          </a:prstGeom>
+          <a:ln>
+            <a:solidFill>
+              <a:srgbClr val="FF0000"/>
+            </a:solidFill>
+            <a:tailEnd type="triangle"/>
+          </a:ln>
+        </p:spPr>
+        <p:style>
+          <a:lnRef idx="1">
+            <a:schemeClr val="accent2"/>
+          </a:lnRef>
+          <a:fillRef idx="0">
+            <a:schemeClr val="accent2"/>
+          </a:fillRef>
+          <a:effectRef idx="0">
+            <a:schemeClr val="accent2"/>
+          </a:effectRef>
+          <a:fontRef idx="minor">
+            <a:schemeClr val="tx1"/>
+          </a:fontRef>
+        </p:style>
+      </p:cxnSp>
+      <p:pic>
+        <p:nvPicPr>
+          <p:cNvPr id="8" name="Imagem 7"/>
+          <p:cNvPicPr>
+            <a:picLocks noChangeAspect="1"/>
+          </p:cNvPicPr>
+          <p:nvPr/>
+        </p:nvPicPr>
+        <p:blipFill>
+          <a:blip r:embed="rId3"/>
+          <a:stretch>
+            <a:fillRect/>
+          </a:stretch>
+        </p:blipFill>
+        <p:spPr>
+          <a:xfrm>
+            <a:off x="7110805" y="3937411"/>
+            <a:ext cx="2276475" cy="1647825"/>
+          </a:xfrm>
+          <a:prstGeom prst="rect">
+            <a:avLst/>
+          </a:prstGeom>
+        </p:spPr>
+      </p:pic>
+      <p:sp>
+        <p:nvSpPr>
+          <p:cNvPr id="9" name="CaixaDeTexto 8"/>
+          <p:cNvSpPr txBox="1"/>
+          <p:nvPr/>
+        </p:nvSpPr>
+        <p:spPr>
+          <a:xfrm>
+            <a:off x="1409251" y="6239435"/>
+            <a:ext cx="763793" cy="369332"/>
+          </a:xfrm>
+          <a:prstGeom prst="rect">
+            <a:avLst/>
+          </a:prstGeom>
+          <a:noFill/>
+        </p:spPr>
+        <p:txBody>
+          <a:bodyPr wrap="square" rtlCol="0">
+            <a:spAutoFit/>
+          </a:bodyPr>
+          <a:lstStyle/>
+          <a:p>
+            <a:r>
+              <a:rPr lang="pt-BR" dirty="0" smtClean="0"/>
+              <a:t>fig1</a:t>
+            </a:r>
+            <a:endParaRPr lang="pt-BR" dirty="0"/>
+          </a:p>
+        </p:txBody>
+      </p:sp>
+      <p:sp>
+        <p:nvSpPr>
+          <p:cNvPr id="12" name="CaixaDeTexto 11"/>
+          <p:cNvSpPr txBox="1"/>
+          <p:nvPr/>
+        </p:nvSpPr>
+        <p:spPr>
+          <a:xfrm>
+            <a:off x="7121562" y="5648800"/>
+            <a:ext cx="763793" cy="369332"/>
+          </a:xfrm>
+          <a:prstGeom prst="rect">
+            <a:avLst/>
+          </a:prstGeom>
+          <a:noFill/>
+        </p:spPr>
+        <p:txBody>
+          <a:bodyPr wrap="square" rtlCol="0">
+            <a:spAutoFit/>
+          </a:bodyPr>
+          <a:lstStyle/>
+          <a:p>
+            <a:r>
+              <a:rPr lang="pt-BR" dirty="0" smtClean="0"/>
+              <a:t>fig2</a:t>
+            </a:r>
+            <a:endParaRPr lang="pt-BR" dirty="0"/>
           </a:p>
         </p:txBody>
       </p:sp>
     </p:spTree>
     <p:extLst>
       <p:ext uri="{BB962C8B-B14F-4D97-AF65-F5344CB8AC3E}">
-        <p14:creationId xmlns:p14="http://schemas.microsoft.com/office/powerpoint/2010/main" val="3632012015"/>
+        <p14:creationId xmlns:p14="http://schemas.microsoft.com/office/powerpoint/2010/main" val="3687231311"/>
       </p:ext>
     </p:extLst>
   </p:cSld>
@@ -3408,7 +3489,7 @@
                 </a:solidFill>
                 <a:latin typeface="Corbel" panose="020B0503020204020204" pitchFamily="34" charset="0"/>
               </a:rPr>
-              <a:t>ATIVIDADE</a:t>
+              <a:t>Comandos com Listas -  Auto Filtro</a:t>
             </a:r>
           </a:p>
         </p:txBody>
@@ -3423,7 +3504,7 @@
         </p:nvSpPr>
         <p:spPr>
           <a:xfrm>
-            <a:off x="692971" y="1913794"/>
+            <a:off x="327211" y="988637"/>
             <a:ext cx="10896600" cy="2817812"/>
           </a:xfrm>
         </p:spPr>
@@ -3589,16 +3670,3136 @@
               <a:buNone/>
             </a:pPr>
             <a:r>
-              <a:rPr lang="pt-BR" sz="1800" dirty="0" smtClean="0"/>
-              <a:t>USE ARQUIVO DE FORNECEDORES PARA FAZER MEDIA, SOMA, CONTAGEM POR GERENTE, DIRETOR E DEPARTARMENTO.</a:t>
-            </a:r>
+              <a:rPr lang="pt-BR" sz="1800" dirty="0" smtClean="0">
+                <a:latin typeface="Corbel" panose="020B0503020204020204" pitchFamily="34" charset="0"/>
+              </a:rPr>
+              <a:t>Ainda temos uma poderosa ferramenta de analise de listas chamadas de </a:t>
+            </a:r>
+            <a:r>
+              <a:rPr lang="pt-BR" sz="1800" dirty="0" err="1" smtClean="0">
+                <a:latin typeface="Corbel" panose="020B0503020204020204" pitchFamily="34" charset="0"/>
+              </a:rPr>
+              <a:t>Auto-filtro</a:t>
+            </a:r>
+            <a:r>
+              <a:rPr lang="pt-BR" sz="1800" dirty="0" smtClean="0">
+                <a:latin typeface="Corbel" panose="020B0503020204020204" pitchFamily="34" charset="0"/>
+              </a:rPr>
+              <a:t> (somente para colunas) que agrupam automaticamente as informações repetidas e permitem deixar na tela somente o grupo que queremos analisar</a:t>
+            </a:r>
+          </a:p>
+          <a:p>
+            <a:pPr marL="0" indent="0">
+              <a:buFont typeface="Arial" charset="0"/>
+              <a:buNone/>
+            </a:pPr>
+            <a:r>
+              <a:rPr lang="pt-BR" sz="1800" dirty="0">
+                <a:latin typeface="Corbel" panose="020B0503020204020204" pitchFamily="34" charset="0"/>
+              </a:rPr>
+              <a:t> </a:t>
+            </a:r>
+            <a:r>
+              <a:rPr lang="pt-BR" sz="1800" dirty="0" smtClean="0">
+                <a:latin typeface="Corbel" panose="020B0503020204020204" pitchFamily="34" charset="0"/>
+              </a:rPr>
+              <a:t>- Filtro por Cor , valor único ou intervalo de valores, texto, caracteres curingas ( * e  ? </a:t>
+            </a:r>
+            <a:r>
+              <a:rPr lang="pt-BR" sz="1800" dirty="0" smtClean="0">
+                <a:latin typeface="Corbel" panose="020B0503020204020204" pitchFamily="34" charset="0"/>
+              </a:rPr>
+              <a:t>).</a:t>
+            </a:r>
+          </a:p>
+          <a:p>
+            <a:pPr marL="0" indent="0">
+              <a:buFont typeface="Arial" charset="0"/>
+              <a:buNone/>
+            </a:pPr>
+            <a:r>
+              <a:rPr lang="pt-BR" sz="1800" dirty="0">
+                <a:latin typeface="Corbel" panose="020B0503020204020204" pitchFamily="34" charset="0"/>
+              </a:rPr>
+              <a:t>	</a:t>
+            </a:r>
+            <a:r>
+              <a:rPr lang="pt-BR" sz="1800" dirty="0" smtClean="0">
+                <a:latin typeface="Corbel" panose="020B0503020204020204" pitchFamily="34" charset="0"/>
+              </a:rPr>
+              <a:t>-? &gt; “1 único” </a:t>
+            </a:r>
+            <a:r>
+              <a:rPr lang="pt-BR" sz="1800" dirty="0" err="1" smtClean="0">
+                <a:latin typeface="Corbel" panose="020B0503020204020204" pitchFamily="34" charset="0"/>
+              </a:rPr>
+              <a:t>caracter</a:t>
+            </a:r>
+            <a:r>
+              <a:rPr lang="pt-BR" sz="1800" dirty="0" smtClean="0">
+                <a:latin typeface="Corbel" panose="020B0503020204020204" pitchFamily="34" charset="0"/>
+              </a:rPr>
+              <a:t> qualquer</a:t>
+            </a:r>
+          </a:p>
+          <a:p>
+            <a:pPr marL="0" indent="0">
+              <a:buFont typeface="Arial" charset="0"/>
+              <a:buNone/>
+            </a:pPr>
+            <a:r>
+              <a:rPr lang="pt-BR" sz="1800" dirty="0">
+                <a:latin typeface="Corbel" panose="020B0503020204020204" pitchFamily="34" charset="0"/>
+              </a:rPr>
+              <a:t>	</a:t>
+            </a:r>
+            <a:r>
+              <a:rPr lang="pt-BR" sz="1800" dirty="0" smtClean="0">
+                <a:latin typeface="Corbel" panose="020B0503020204020204" pitchFamily="34" charset="0"/>
+              </a:rPr>
+              <a:t>-* &gt; qualquer coisa serve</a:t>
+            </a:r>
+          </a:p>
+          <a:p>
+            <a:pPr marL="0" indent="0">
+              <a:buFont typeface="Arial" charset="0"/>
+              <a:buNone/>
+            </a:pPr>
+            <a:r>
+              <a:rPr lang="pt-BR" sz="1800" dirty="0">
+                <a:latin typeface="Corbel" panose="020B0503020204020204" pitchFamily="34" charset="0"/>
+              </a:rPr>
+              <a:t>	</a:t>
+            </a:r>
+            <a:r>
+              <a:rPr lang="pt-BR" sz="1800" dirty="0" smtClean="0">
+                <a:latin typeface="Corbel" panose="020B0503020204020204" pitchFamily="34" charset="0"/>
+              </a:rPr>
+              <a:t>?p*  &gt; toda as palavras onde “p” esta na segunda posição</a:t>
+            </a:r>
+          </a:p>
+          <a:p>
+            <a:pPr marL="0" indent="0">
+              <a:buFont typeface="Arial" charset="0"/>
+              <a:buNone/>
+            </a:pPr>
+            <a:r>
+              <a:rPr lang="pt-BR" sz="1800" dirty="0">
+                <a:latin typeface="Corbel" panose="020B0503020204020204" pitchFamily="34" charset="0"/>
+              </a:rPr>
+              <a:t>	</a:t>
+            </a:r>
+            <a:r>
+              <a:rPr lang="pt-BR" sz="1800" dirty="0" err="1" smtClean="0">
+                <a:latin typeface="Corbel" panose="020B0503020204020204" pitchFamily="34" charset="0"/>
+              </a:rPr>
+              <a:t>Br</a:t>
+            </a:r>
+            <a:r>
+              <a:rPr lang="pt-BR" sz="1800" dirty="0" smtClean="0">
+                <a:latin typeface="Corbel" panose="020B0503020204020204" pitchFamily="34" charset="0"/>
+              </a:rPr>
+              <a:t>* &gt; todas as palavras que comecem com “</a:t>
+            </a:r>
+            <a:r>
+              <a:rPr lang="pt-BR" sz="1800" dirty="0" err="1" smtClean="0">
+                <a:latin typeface="Corbel" panose="020B0503020204020204" pitchFamily="34" charset="0"/>
+              </a:rPr>
+              <a:t>Br</a:t>
+            </a:r>
+            <a:r>
+              <a:rPr lang="pt-BR" sz="1800" dirty="0" smtClean="0">
+                <a:latin typeface="Corbel" panose="020B0503020204020204" pitchFamily="34" charset="0"/>
+              </a:rPr>
+              <a:t>”.</a:t>
+            </a:r>
+            <a:endParaRPr lang="pt-BR" sz="1800" dirty="0" smtClean="0">
+              <a:latin typeface="Corbel" panose="020B0503020204020204" pitchFamily="34" charset="0"/>
+            </a:endParaRPr>
+          </a:p>
+          <a:p>
+            <a:pPr marL="0" indent="0">
+              <a:buFont typeface="Arial" charset="0"/>
+              <a:buNone/>
+            </a:pPr>
+            <a:endParaRPr lang="pt-BR" sz="1800" dirty="0" smtClean="0">
+              <a:latin typeface="Corbel" panose="020B0503020204020204" pitchFamily="34" charset="0"/>
+            </a:endParaRPr>
+          </a:p>
+          <a:p>
+            <a:pPr marL="0" indent="0">
+              <a:buFont typeface="Arial" charset="0"/>
+              <a:buNone/>
+            </a:pPr>
+            <a:endParaRPr lang="pt-BR" sz="1800" dirty="0">
+              <a:latin typeface="Corbel" panose="020B0503020204020204" pitchFamily="34" charset="0"/>
+            </a:endParaRPr>
+          </a:p>
+          <a:p>
+            <a:pPr marL="0" indent="0">
+              <a:buFont typeface="Arial" charset="0"/>
+              <a:buNone/>
+            </a:pPr>
+            <a:r>
+              <a:rPr lang="pt-BR" sz="1800" dirty="0" smtClean="0">
+                <a:solidFill>
+                  <a:srgbClr val="FF0000"/>
+                </a:solidFill>
+                <a:latin typeface="Corbel" panose="020B0503020204020204" pitchFamily="34" charset="0"/>
+              </a:rPr>
+              <a:t>CUIDADO: </a:t>
+            </a:r>
+            <a:r>
+              <a:rPr lang="pt-BR" sz="1800" dirty="0" smtClean="0">
+                <a:latin typeface="Corbel" panose="020B0503020204020204" pitchFamily="34" charset="0"/>
+              </a:rPr>
+              <a:t>Maioria das FÓRMULAS  desconsidera o FILTRO. Exceção: </a:t>
+            </a:r>
+            <a:r>
+              <a:rPr lang="pt-BR" sz="1800" dirty="0" smtClean="0">
+                <a:latin typeface="Corbel" panose="020B0503020204020204" pitchFamily="34" charset="0"/>
+              </a:rPr>
+              <a:t>fórmula </a:t>
+            </a:r>
+            <a:r>
+              <a:rPr lang="pt-BR" sz="1800" dirty="0" smtClean="0">
+                <a:latin typeface="Corbel" panose="020B0503020204020204" pitchFamily="34" charset="0"/>
+              </a:rPr>
+              <a:t>SUBTOTAL.</a:t>
+            </a:r>
+          </a:p>
+          <a:p>
+            <a:pPr marL="0" indent="0">
+              <a:buFont typeface="Arial" charset="0"/>
+              <a:buNone/>
+            </a:pPr>
+            <a:endParaRPr lang="pt-BR" sz="1800" dirty="0">
+              <a:latin typeface="Corbel" panose="020B0503020204020204" pitchFamily="34" charset="0"/>
+            </a:endParaRPr>
+          </a:p>
+          <a:p>
+            <a:pPr marL="0" indent="0">
+              <a:buFont typeface="Arial" charset="0"/>
+              <a:buNone/>
+            </a:pPr>
+            <a:r>
+              <a:rPr lang="pt-BR" sz="1800" dirty="0" smtClean="0">
+                <a:latin typeface="Corbel" panose="020B0503020204020204" pitchFamily="34" charset="0"/>
+              </a:rPr>
+              <a:t>Acesso por: Selecionar intervalo de análise, Guia dados, grupo Classificar a Filtrar, Comando Filtro.</a:t>
+            </a:r>
+          </a:p>
+          <a:p>
+            <a:pPr marL="0" indent="0">
+              <a:buFont typeface="Arial" charset="0"/>
+              <a:buNone/>
+            </a:pPr>
+            <a:r>
+              <a:rPr lang="pt-BR" sz="1800" dirty="0" smtClean="0">
+                <a:latin typeface="Corbel" panose="020B0503020204020204" pitchFamily="34" charset="0"/>
+              </a:rPr>
+              <a:t>(ira aparecer um “menu” no cabeçalho de cada Coluna</a:t>
+            </a:r>
+          </a:p>
+          <a:p>
+            <a:pPr marL="0" indent="0">
+              <a:buFont typeface="Arial" charset="0"/>
+              <a:buNone/>
+            </a:pPr>
+            <a:r>
+              <a:rPr lang="pt-BR" sz="1800" dirty="0" smtClean="0">
+                <a:latin typeface="Corbel" panose="020B0503020204020204" pitchFamily="34" charset="0"/>
+              </a:rPr>
+              <a:t> </a:t>
+            </a:r>
+          </a:p>
+          <a:p>
+            <a:pPr marL="0" indent="0">
+              <a:buFont typeface="Arial" charset="0"/>
+              <a:buNone/>
+            </a:pPr>
+            <a:endParaRPr lang="pt-BR" sz="1800" dirty="0" smtClean="0">
+              <a:latin typeface="Corbel" panose="020B0503020204020204" pitchFamily="34" charset="0"/>
+            </a:endParaRPr>
+          </a:p>
+          <a:p>
+            <a:pPr marL="0" indent="0">
+              <a:buFont typeface="Arial" charset="0"/>
+              <a:buNone/>
+            </a:pPr>
+            <a:endParaRPr lang="pt-BR" sz="1800" dirty="0" smtClean="0">
+              <a:latin typeface="Corbel" panose="020B0503020204020204" pitchFamily="34" charset="0"/>
+            </a:endParaRPr>
           </a:p>
         </p:txBody>
       </p:sp>
     </p:spTree>
     <p:extLst>
       <p:ext uri="{BB962C8B-B14F-4D97-AF65-F5344CB8AC3E}">
-        <p14:creationId xmlns:p14="http://schemas.microsoft.com/office/powerpoint/2010/main" val="1347096940"/>
+        <p14:creationId xmlns:p14="http://schemas.microsoft.com/office/powerpoint/2010/main" val="2457458818"/>
+      </p:ext>
+    </p:extLst>
+  </p:cSld>
+  <p:clrMapOvr>
+    <a:masterClrMapping/>
+  </p:clrMapOvr>
+  <p:timing>
+    <p:tnLst>
+      <p:par>
+        <p:cTn id="1" dur="indefinite" restart="never" nodeType="tmRoot"/>
+      </p:par>
+    </p:tnLst>
+  </p:timing>
+</p:sld>
+</file>
+
+<file path=ppt/slides/slide6.xml><?xml version="1.0" encoding="utf-8"?>
+<p:sld xmlns:a="http://schemas.openxmlformats.org/drawingml/2006/main" xmlns:r="http://schemas.openxmlformats.org/officeDocument/2006/relationships" xmlns:p="http://schemas.openxmlformats.org/presentationml/2006/main">
+  <p:cSld>
+    <p:spTree>
+      <p:nvGrpSpPr>
+        <p:cNvPr id="1" name=""/>
+        <p:cNvGrpSpPr/>
+        <p:nvPr/>
+      </p:nvGrpSpPr>
+      <p:grpSpPr>
+        <a:xfrm>
+          <a:off x="0" y="0"/>
+          <a:ext cx="0" cy="0"/>
+          <a:chOff x="0" y="0"/>
+          <a:chExt cx="0" cy="0"/>
+        </a:xfrm>
+      </p:grpSpPr>
+      <p:sp>
+        <p:nvSpPr>
+          <p:cNvPr id="6" name="Subtítulo 2"/>
+          <p:cNvSpPr txBox="1">
+            <a:spLocks/>
+          </p:cNvSpPr>
+          <p:nvPr/>
+        </p:nvSpPr>
+        <p:spPr>
+          <a:xfrm>
+            <a:off x="210670" y="153054"/>
+            <a:ext cx="10058400" cy="718315"/>
+          </a:xfrm>
+        </p:spPr>
+        <p:txBody>
+          <a:bodyPr>
+            <a:noAutofit/>
+          </a:bodyPr>
+          <a:lstStyle>
+            <a:lvl1pPr marL="342900" indent="-342900" algn="l" rtl="0" eaLnBrk="0" fontAlgn="base" hangingPunct="0">
+              <a:spcBef>
+                <a:spcPct val="20000"/>
+              </a:spcBef>
+              <a:spcAft>
+                <a:spcPct val="0"/>
+              </a:spcAft>
+              <a:buFont typeface="Arial" charset="0"/>
+              <a:buChar char="•"/>
+              <a:defRPr lang="pt-BR" sz="2800" kern="1200" dirty="0">
+                <a:solidFill>
+                  <a:schemeClr val="tx1"/>
+                </a:solidFill>
+                <a:latin typeface="+mn-lt"/>
+                <a:ea typeface="+mn-ea"/>
+                <a:cs typeface="+mn-cs"/>
+              </a:defRPr>
+            </a:lvl1pPr>
+            <a:lvl2pPr marL="742950" indent="-285750" algn="l" rtl="0" eaLnBrk="0" fontAlgn="base" hangingPunct="0">
+              <a:spcBef>
+                <a:spcPct val="20000"/>
+              </a:spcBef>
+              <a:spcAft>
+                <a:spcPct val="0"/>
+              </a:spcAft>
+              <a:buFont typeface="Arial" charset="0"/>
+              <a:buChar char="•"/>
+              <a:defRPr lang="pt-BR" sz="2400" kern="1200" dirty="0">
+                <a:solidFill>
+                  <a:schemeClr val="tx1"/>
+                </a:solidFill>
+                <a:latin typeface="+mn-lt"/>
+                <a:ea typeface="+mn-ea"/>
+                <a:cs typeface="+mn-cs"/>
+              </a:defRPr>
+            </a:lvl2pPr>
+            <a:lvl3pPr marL="1143000" indent="-228600" algn="l" rtl="0" eaLnBrk="0" fontAlgn="base" hangingPunct="0">
+              <a:spcBef>
+                <a:spcPct val="20000"/>
+              </a:spcBef>
+              <a:spcAft>
+                <a:spcPct val="0"/>
+              </a:spcAft>
+              <a:buFont typeface="Arial" charset="0"/>
+              <a:buChar char="•"/>
+              <a:defRPr lang="pt-BR" sz="2400" kern="1200" dirty="0">
+                <a:solidFill>
+                  <a:schemeClr val="tx1"/>
+                </a:solidFill>
+                <a:latin typeface="+mn-lt"/>
+                <a:ea typeface="+mn-ea"/>
+                <a:cs typeface="+mn-cs"/>
+              </a:defRPr>
+            </a:lvl3pPr>
+            <a:lvl4pPr marL="1600200" indent="-228600" algn="l" rtl="0" eaLnBrk="0" fontAlgn="base" hangingPunct="0">
+              <a:spcBef>
+                <a:spcPct val="20000"/>
+              </a:spcBef>
+              <a:spcAft>
+                <a:spcPct val="0"/>
+              </a:spcAft>
+              <a:buFont typeface="Arial" charset="0"/>
+              <a:buChar char="•"/>
+              <a:defRPr lang="pt-BR" sz="2000" kern="1200" dirty="0">
+                <a:solidFill>
+                  <a:schemeClr val="tx1"/>
+                </a:solidFill>
+                <a:latin typeface="+mn-lt"/>
+                <a:ea typeface="+mn-ea"/>
+                <a:cs typeface="+mn-cs"/>
+              </a:defRPr>
+            </a:lvl4pPr>
+            <a:lvl5pPr marL="2057400" indent="-228600" algn="l" rtl="0" eaLnBrk="0" fontAlgn="base" hangingPunct="0">
+              <a:spcBef>
+                <a:spcPct val="20000"/>
+              </a:spcBef>
+              <a:spcAft>
+                <a:spcPct val="0"/>
+              </a:spcAft>
+              <a:buFont typeface="Arial" charset="0"/>
+              <a:buChar char="•"/>
+              <a:defRPr lang="pt-BR" sz="2000" kern="1200" dirty="0">
+                <a:solidFill>
+                  <a:schemeClr val="tx1"/>
+                </a:solidFill>
+                <a:latin typeface="+mn-lt"/>
+                <a:ea typeface="+mn-ea"/>
+                <a:cs typeface="+mn-cs"/>
+              </a:defRPr>
+            </a:lvl5pPr>
+            <a:lvl6pPr marL="2514600" indent="-228600" algn="l" defTabSz="914400" rtl="0" eaLnBrk="1" latinLnBrk="0" hangingPunct="1">
+              <a:spcBef>
+                <a:spcPct val="20000"/>
+              </a:spcBef>
+              <a:buFont typeface="Arial" pitchFamily="34" charset="0"/>
+              <a:buChar char="•"/>
+              <a:defRPr sz="2000" kern="1200">
+                <a:solidFill>
+                  <a:schemeClr val="tx1"/>
+                </a:solidFill>
+                <a:latin typeface="+mn-lt"/>
+                <a:ea typeface="+mn-ea"/>
+                <a:cs typeface="+mn-cs"/>
+              </a:defRPr>
+            </a:lvl6pPr>
+            <a:lvl7pPr marL="2971800" indent="-228600" algn="l" defTabSz="914400" rtl="0" eaLnBrk="1" latinLnBrk="0" hangingPunct="1">
+              <a:spcBef>
+                <a:spcPct val="20000"/>
+              </a:spcBef>
+              <a:buFont typeface="Arial" pitchFamily="34" charset="0"/>
+              <a:buChar char="•"/>
+              <a:defRPr sz="2000" kern="1200">
+                <a:solidFill>
+                  <a:schemeClr val="tx1"/>
+                </a:solidFill>
+                <a:latin typeface="+mn-lt"/>
+                <a:ea typeface="+mn-ea"/>
+                <a:cs typeface="+mn-cs"/>
+              </a:defRPr>
+            </a:lvl7pPr>
+            <a:lvl8pPr marL="3429000" indent="-228600" algn="l" defTabSz="914400" rtl="0" eaLnBrk="1" latinLnBrk="0" hangingPunct="1">
+              <a:spcBef>
+                <a:spcPct val="20000"/>
+              </a:spcBef>
+              <a:buFont typeface="Arial" pitchFamily="34" charset="0"/>
+              <a:buChar char="•"/>
+              <a:defRPr sz="2000" kern="1200">
+                <a:solidFill>
+                  <a:schemeClr val="tx1"/>
+                </a:solidFill>
+                <a:latin typeface="+mn-lt"/>
+                <a:ea typeface="+mn-ea"/>
+                <a:cs typeface="+mn-cs"/>
+              </a:defRPr>
+            </a:lvl8pPr>
+            <a:lvl9pPr marL="3886200" indent="-228600" algn="l" defTabSz="914400" rtl="0" eaLnBrk="1" latinLnBrk="0" hangingPunct="1">
+              <a:spcBef>
+                <a:spcPct val="20000"/>
+              </a:spcBef>
+              <a:buFont typeface="Arial" pitchFamily="34" charset="0"/>
+              <a:buChar char="•"/>
+              <a:defRPr sz="2000" kern="1200">
+                <a:solidFill>
+                  <a:schemeClr val="tx1"/>
+                </a:solidFill>
+                <a:latin typeface="+mn-lt"/>
+                <a:ea typeface="+mn-ea"/>
+                <a:cs typeface="+mn-cs"/>
+              </a:defRPr>
+            </a:lvl9pPr>
+          </a:lstStyle>
+          <a:p>
+            <a:pPr marL="0" indent="0">
+              <a:lnSpc>
+                <a:spcPct val="150000"/>
+              </a:lnSpc>
+              <a:buFont typeface="Arial" charset="0"/>
+              <a:buNone/>
+            </a:pPr>
+            <a:r>
+              <a:rPr lang="pt-BR" sz="2400" b="1" dirty="0" smtClean="0">
+                <a:solidFill>
+                  <a:schemeClr val="accent6">
+                    <a:lumMod val="75000"/>
+                  </a:schemeClr>
+                </a:solidFill>
+                <a:latin typeface="Corbel" panose="020B0503020204020204" pitchFamily="34" charset="0"/>
+              </a:rPr>
+              <a:t>Comandos com Listas -  </a:t>
+            </a:r>
+            <a:r>
+              <a:rPr lang="pt-BR" sz="2400" b="1" dirty="0" smtClean="0">
+                <a:solidFill>
+                  <a:schemeClr val="accent6">
+                    <a:lumMod val="75000"/>
+                  </a:schemeClr>
+                </a:solidFill>
+                <a:latin typeface="Corbel" panose="020B0503020204020204" pitchFamily="34" charset="0"/>
+              </a:rPr>
+              <a:t>Subtotal</a:t>
+            </a:r>
+            <a:endParaRPr lang="pt-BR" sz="2400" b="1" dirty="0" smtClean="0">
+              <a:solidFill>
+                <a:schemeClr val="accent6">
+                  <a:lumMod val="75000"/>
+                </a:schemeClr>
+              </a:solidFill>
+              <a:latin typeface="Corbel" panose="020B0503020204020204" pitchFamily="34" charset="0"/>
+            </a:endParaRPr>
+          </a:p>
+        </p:txBody>
+      </p:sp>
+      <p:sp>
+        <p:nvSpPr>
+          <p:cNvPr id="11" name="Subtítulo 1"/>
+          <p:cNvSpPr txBox="1">
+            <a:spLocks/>
+          </p:cNvSpPr>
+          <p:nvPr/>
+        </p:nvSpPr>
+        <p:spPr>
+          <a:xfrm>
+            <a:off x="327211" y="988637"/>
+            <a:ext cx="10896600" cy="2817812"/>
+          </a:xfrm>
+        </p:spPr>
+        <p:txBody>
+          <a:bodyPr>
+            <a:noAutofit/>
+          </a:bodyPr>
+          <a:lstStyle>
+            <a:lvl1pPr marL="342900" indent="-342900" algn="l" rtl="0" eaLnBrk="0" fontAlgn="base" hangingPunct="0">
+              <a:spcBef>
+                <a:spcPct val="20000"/>
+              </a:spcBef>
+              <a:spcAft>
+                <a:spcPct val="0"/>
+              </a:spcAft>
+              <a:buFont typeface="Arial" charset="0"/>
+              <a:buChar char="•"/>
+              <a:defRPr lang="pt-BR" sz="2800" kern="1200" dirty="0">
+                <a:solidFill>
+                  <a:schemeClr val="tx1"/>
+                </a:solidFill>
+                <a:latin typeface="+mn-lt"/>
+                <a:ea typeface="+mn-ea"/>
+                <a:cs typeface="+mn-cs"/>
+              </a:defRPr>
+            </a:lvl1pPr>
+            <a:lvl2pPr marL="742950" indent="-285750" algn="l" rtl="0" eaLnBrk="0" fontAlgn="base" hangingPunct="0">
+              <a:spcBef>
+                <a:spcPct val="20000"/>
+              </a:spcBef>
+              <a:spcAft>
+                <a:spcPct val="0"/>
+              </a:spcAft>
+              <a:buFont typeface="Arial" charset="0"/>
+              <a:buChar char="•"/>
+              <a:defRPr lang="pt-BR" sz="2400" kern="1200" dirty="0">
+                <a:solidFill>
+                  <a:schemeClr val="tx1"/>
+                </a:solidFill>
+                <a:latin typeface="+mn-lt"/>
+                <a:ea typeface="+mn-ea"/>
+                <a:cs typeface="+mn-cs"/>
+              </a:defRPr>
+            </a:lvl2pPr>
+            <a:lvl3pPr marL="1143000" indent="-228600" algn="l" rtl="0" eaLnBrk="0" fontAlgn="base" hangingPunct="0">
+              <a:spcBef>
+                <a:spcPct val="20000"/>
+              </a:spcBef>
+              <a:spcAft>
+                <a:spcPct val="0"/>
+              </a:spcAft>
+              <a:buFont typeface="Arial" charset="0"/>
+              <a:buChar char="•"/>
+              <a:defRPr lang="pt-BR" sz="2400" kern="1200" dirty="0">
+                <a:solidFill>
+                  <a:schemeClr val="tx1"/>
+                </a:solidFill>
+                <a:latin typeface="+mn-lt"/>
+                <a:ea typeface="+mn-ea"/>
+                <a:cs typeface="+mn-cs"/>
+              </a:defRPr>
+            </a:lvl3pPr>
+            <a:lvl4pPr marL="1600200" indent="-228600" algn="l" rtl="0" eaLnBrk="0" fontAlgn="base" hangingPunct="0">
+              <a:spcBef>
+                <a:spcPct val="20000"/>
+              </a:spcBef>
+              <a:spcAft>
+                <a:spcPct val="0"/>
+              </a:spcAft>
+              <a:buFont typeface="Arial" charset="0"/>
+              <a:buChar char="•"/>
+              <a:defRPr lang="pt-BR" sz="2000" kern="1200" dirty="0">
+                <a:solidFill>
+                  <a:schemeClr val="tx1"/>
+                </a:solidFill>
+                <a:latin typeface="+mn-lt"/>
+                <a:ea typeface="+mn-ea"/>
+                <a:cs typeface="+mn-cs"/>
+              </a:defRPr>
+            </a:lvl4pPr>
+            <a:lvl5pPr marL="2057400" indent="-228600" algn="l" rtl="0" eaLnBrk="0" fontAlgn="base" hangingPunct="0">
+              <a:spcBef>
+                <a:spcPct val="20000"/>
+              </a:spcBef>
+              <a:spcAft>
+                <a:spcPct val="0"/>
+              </a:spcAft>
+              <a:buFont typeface="Arial" charset="0"/>
+              <a:buChar char="•"/>
+              <a:defRPr lang="pt-BR" sz="2000" kern="1200" dirty="0">
+                <a:solidFill>
+                  <a:schemeClr val="tx1"/>
+                </a:solidFill>
+                <a:latin typeface="+mn-lt"/>
+                <a:ea typeface="+mn-ea"/>
+                <a:cs typeface="+mn-cs"/>
+              </a:defRPr>
+            </a:lvl5pPr>
+            <a:lvl6pPr marL="2514600" indent="-228600" algn="l" defTabSz="914400" rtl="0" eaLnBrk="1" latinLnBrk="0" hangingPunct="1">
+              <a:spcBef>
+                <a:spcPct val="20000"/>
+              </a:spcBef>
+              <a:buFont typeface="Arial" pitchFamily="34" charset="0"/>
+              <a:buChar char="•"/>
+              <a:defRPr sz="2000" kern="1200">
+                <a:solidFill>
+                  <a:schemeClr val="tx1"/>
+                </a:solidFill>
+                <a:latin typeface="+mn-lt"/>
+                <a:ea typeface="+mn-ea"/>
+                <a:cs typeface="+mn-cs"/>
+              </a:defRPr>
+            </a:lvl6pPr>
+            <a:lvl7pPr marL="2971800" indent="-228600" algn="l" defTabSz="914400" rtl="0" eaLnBrk="1" latinLnBrk="0" hangingPunct="1">
+              <a:spcBef>
+                <a:spcPct val="20000"/>
+              </a:spcBef>
+              <a:buFont typeface="Arial" pitchFamily="34" charset="0"/>
+              <a:buChar char="•"/>
+              <a:defRPr sz="2000" kern="1200">
+                <a:solidFill>
+                  <a:schemeClr val="tx1"/>
+                </a:solidFill>
+                <a:latin typeface="+mn-lt"/>
+                <a:ea typeface="+mn-ea"/>
+                <a:cs typeface="+mn-cs"/>
+              </a:defRPr>
+            </a:lvl7pPr>
+            <a:lvl8pPr marL="3429000" indent="-228600" algn="l" defTabSz="914400" rtl="0" eaLnBrk="1" latinLnBrk="0" hangingPunct="1">
+              <a:spcBef>
+                <a:spcPct val="20000"/>
+              </a:spcBef>
+              <a:buFont typeface="Arial" pitchFamily="34" charset="0"/>
+              <a:buChar char="•"/>
+              <a:defRPr sz="2000" kern="1200">
+                <a:solidFill>
+                  <a:schemeClr val="tx1"/>
+                </a:solidFill>
+                <a:latin typeface="+mn-lt"/>
+                <a:ea typeface="+mn-ea"/>
+                <a:cs typeface="+mn-cs"/>
+              </a:defRPr>
+            </a:lvl8pPr>
+            <a:lvl9pPr marL="3886200" indent="-228600" algn="l" defTabSz="914400" rtl="0" eaLnBrk="1" latinLnBrk="0" hangingPunct="1">
+              <a:spcBef>
+                <a:spcPct val="20000"/>
+              </a:spcBef>
+              <a:buFont typeface="Arial" pitchFamily="34" charset="0"/>
+              <a:buChar char="•"/>
+              <a:defRPr sz="2000" kern="1200">
+                <a:solidFill>
+                  <a:schemeClr val="tx1"/>
+                </a:solidFill>
+                <a:latin typeface="+mn-lt"/>
+                <a:ea typeface="+mn-ea"/>
+                <a:cs typeface="+mn-cs"/>
+              </a:defRPr>
+            </a:lvl9pPr>
+          </a:lstStyle>
+          <a:p>
+            <a:pPr marL="0" indent="0">
+              <a:buFont typeface="Arial" charset="0"/>
+              <a:buNone/>
+            </a:pPr>
+            <a:r>
+              <a:rPr lang="pt-BR" sz="1800" dirty="0" smtClean="0">
+                <a:latin typeface="Corbel" panose="020B0503020204020204" pitchFamily="34" charset="0"/>
+              </a:rPr>
+              <a:t>Capaz de gerar em segundos um relatório resumindo uma operação (soma, media, contagem) em cada alteração do valor das linhas (</a:t>
+            </a:r>
+            <a:r>
+              <a:rPr lang="pt-BR" sz="1800" dirty="0" err="1" smtClean="0">
+                <a:latin typeface="Corbel" panose="020B0503020204020204" pitchFamily="34" charset="0"/>
+              </a:rPr>
+              <a:t>fig</a:t>
+            </a:r>
+            <a:r>
+              <a:rPr lang="pt-BR" sz="1800" dirty="0" smtClean="0">
+                <a:latin typeface="Corbel" panose="020B0503020204020204" pitchFamily="34" charset="0"/>
+              </a:rPr>
+              <a:t> 1).</a:t>
+            </a:r>
+          </a:p>
+          <a:p>
+            <a:pPr marL="0" indent="0">
+              <a:buFont typeface="Arial" charset="0"/>
+              <a:buNone/>
+            </a:pPr>
+            <a:r>
+              <a:rPr lang="pt-BR" sz="1800" dirty="0" smtClean="0">
+                <a:latin typeface="Corbel" panose="020B0503020204020204" pitchFamily="34" charset="0"/>
+              </a:rPr>
+              <a:t>Caminho:</a:t>
+            </a:r>
+          </a:p>
+          <a:p>
+            <a:pPr marL="0" indent="0">
+              <a:buFont typeface="Arial" charset="0"/>
+              <a:buNone/>
+            </a:pPr>
+            <a:r>
+              <a:rPr lang="pt-BR" sz="1800" dirty="0" smtClean="0">
+                <a:latin typeface="Corbel" panose="020B0503020204020204" pitchFamily="34" charset="0"/>
+              </a:rPr>
+              <a:t>Selecionar Lista (</a:t>
+            </a:r>
+            <a:r>
+              <a:rPr lang="pt-BR" sz="1800" dirty="0" err="1" smtClean="0">
+                <a:latin typeface="Corbel" panose="020B0503020204020204" pitchFamily="34" charset="0"/>
+              </a:rPr>
+              <a:t>ctrl</a:t>
+            </a:r>
+            <a:r>
+              <a:rPr lang="pt-BR" sz="1800" dirty="0" smtClean="0">
+                <a:latin typeface="Corbel" panose="020B0503020204020204" pitchFamily="34" charset="0"/>
+              </a:rPr>
+              <a:t> +</a:t>
+            </a:r>
+            <a:r>
+              <a:rPr lang="pt-BR" sz="1800" dirty="0" err="1" smtClean="0">
+                <a:latin typeface="Corbel" panose="020B0503020204020204" pitchFamily="34" charset="0"/>
+              </a:rPr>
+              <a:t>Shit</a:t>
+            </a:r>
+            <a:r>
+              <a:rPr lang="pt-BR" sz="1800" dirty="0" smtClean="0">
+                <a:latin typeface="Corbel" panose="020B0503020204020204" pitchFamily="34" charset="0"/>
+              </a:rPr>
+              <a:t> +barra de espaço), Guia Dados, grupo Estrutura de Tópicos, Comando Subtotal</a:t>
+            </a:r>
+          </a:p>
+          <a:p>
+            <a:pPr marL="0" indent="0">
+              <a:buFont typeface="Arial" charset="0"/>
+              <a:buNone/>
+            </a:pPr>
+            <a:endParaRPr lang="pt-BR" sz="1800" dirty="0">
+              <a:latin typeface="Corbel" panose="020B0503020204020204" pitchFamily="34" charset="0"/>
+            </a:endParaRPr>
+          </a:p>
+          <a:p>
+            <a:pPr marL="0" indent="0">
+              <a:buFont typeface="Arial" charset="0"/>
+              <a:buNone/>
+            </a:pPr>
+            <a:r>
+              <a:rPr lang="pt-BR" sz="1800" dirty="0" smtClean="0">
+                <a:solidFill>
+                  <a:srgbClr val="FF0000"/>
+                </a:solidFill>
+                <a:latin typeface="Corbel" panose="020B0503020204020204" pitchFamily="34" charset="0"/>
+              </a:rPr>
+              <a:t>CUIDADO</a:t>
+            </a:r>
+            <a:r>
+              <a:rPr lang="pt-BR" sz="1800" dirty="0" smtClean="0">
+                <a:solidFill>
+                  <a:srgbClr val="FF0000"/>
+                </a:solidFill>
+                <a:latin typeface="Corbel" panose="020B0503020204020204" pitchFamily="34" charset="0"/>
+              </a:rPr>
+              <a:t>: </a:t>
+            </a:r>
+            <a:r>
+              <a:rPr lang="pt-BR" sz="1800" dirty="0" smtClean="0">
+                <a:latin typeface="Corbel" panose="020B0503020204020204" pitchFamily="34" charset="0"/>
+              </a:rPr>
+              <a:t>Use esse comando somente APÓS usar o comando de classificaç</a:t>
+            </a:r>
+            <a:r>
+              <a:rPr lang="pt-BR" sz="1800" dirty="0" smtClean="0">
+                <a:latin typeface="Corbel" panose="020B0503020204020204" pitchFamily="34" charset="0"/>
+              </a:rPr>
+              <a:t>ão</a:t>
+            </a:r>
+            <a:endParaRPr lang="pt-BR" sz="1800" dirty="0" smtClean="0">
+              <a:latin typeface="Corbel" panose="020B0503020204020204" pitchFamily="34" charset="0"/>
+            </a:endParaRPr>
+          </a:p>
+          <a:p>
+            <a:pPr marL="0" indent="0">
+              <a:buFont typeface="Arial" charset="0"/>
+              <a:buNone/>
+            </a:pPr>
+            <a:endParaRPr lang="pt-BR" sz="1800" dirty="0">
+              <a:latin typeface="Corbel" panose="020B0503020204020204" pitchFamily="34" charset="0"/>
+            </a:endParaRPr>
+          </a:p>
+          <a:p>
+            <a:pPr marL="0" indent="0">
+              <a:buFont typeface="Arial" charset="0"/>
+              <a:buNone/>
+            </a:pPr>
+            <a:endParaRPr lang="pt-BR" sz="1800" dirty="0" smtClean="0">
+              <a:latin typeface="Corbel" panose="020B0503020204020204" pitchFamily="34" charset="0"/>
+            </a:endParaRPr>
+          </a:p>
+          <a:p>
+            <a:pPr marL="0" indent="0">
+              <a:buFont typeface="Arial" charset="0"/>
+              <a:buNone/>
+            </a:pPr>
+            <a:endParaRPr lang="pt-BR" sz="1800" dirty="0" smtClean="0">
+              <a:latin typeface="Corbel" panose="020B0503020204020204" pitchFamily="34" charset="0"/>
+            </a:endParaRPr>
+          </a:p>
+        </p:txBody>
+      </p:sp>
+      <p:pic>
+        <p:nvPicPr>
+          <p:cNvPr id="2" name="Imagem 1"/>
+          <p:cNvPicPr>
+            <a:picLocks noChangeAspect="1"/>
+          </p:cNvPicPr>
+          <p:nvPr/>
+        </p:nvPicPr>
+        <p:blipFill>
+          <a:blip r:embed="rId2"/>
+          <a:stretch>
+            <a:fillRect/>
+          </a:stretch>
+        </p:blipFill>
+        <p:spPr>
+          <a:xfrm>
+            <a:off x="729783" y="3276319"/>
+            <a:ext cx="2771775" cy="3209925"/>
+          </a:xfrm>
+          <a:prstGeom prst="rect">
+            <a:avLst/>
+          </a:prstGeom>
+        </p:spPr>
+      </p:pic>
+      <p:sp>
+        <p:nvSpPr>
+          <p:cNvPr id="3" name="Texto Explicativo Retangular com Cantos Arredondados 2"/>
+          <p:cNvSpPr/>
+          <p:nvPr/>
+        </p:nvSpPr>
+        <p:spPr>
+          <a:xfrm>
+            <a:off x="4388223" y="3276319"/>
+            <a:ext cx="1463937" cy="2371446"/>
+          </a:xfrm>
+          <a:prstGeom prst="wedgeRoundRectCallout">
+            <a:avLst>
+              <a:gd name="adj1" fmla="val -111115"/>
+              <a:gd name="adj2" fmla="val -6683"/>
+              <a:gd name="adj3" fmla="val 16667"/>
+            </a:avLst>
+          </a:prstGeom>
+        </p:spPr>
+        <p:style>
+          <a:lnRef idx="2">
+            <a:schemeClr val="accent1">
+              <a:shade val="50000"/>
+            </a:schemeClr>
+          </a:lnRef>
+          <a:fillRef idx="1">
+            <a:schemeClr val="accent1"/>
+          </a:fillRef>
+          <a:effectRef idx="0">
+            <a:schemeClr val="accent1"/>
+          </a:effectRef>
+          <a:fontRef idx="minor">
+            <a:schemeClr val="lt1"/>
+          </a:fontRef>
+        </p:style>
+        <p:txBody>
+          <a:bodyPr rtlCol="0" anchor="ctr"/>
+          <a:lstStyle/>
+          <a:p>
+            <a:pPr algn="ctr"/>
+            <a:r>
+              <a:rPr lang="pt-BR" sz="1200" dirty="0" smtClean="0"/>
+              <a:t>Toda vez que tiver alteração na Coluna “Empresa” o Excel vai usar a função Soma nas coluna “Mai”, “</a:t>
+            </a:r>
+            <a:r>
+              <a:rPr lang="pt-BR" sz="1200" dirty="0" err="1" smtClean="0"/>
+              <a:t>Jun</a:t>
+            </a:r>
+            <a:r>
+              <a:rPr lang="pt-BR" sz="1200" dirty="0" smtClean="0"/>
+              <a:t>”, “</a:t>
+            </a:r>
+            <a:r>
+              <a:rPr lang="pt-BR" sz="1200" dirty="0" err="1" smtClean="0"/>
+              <a:t>Ago</a:t>
+            </a:r>
+            <a:r>
+              <a:rPr lang="pt-BR" sz="1200" dirty="0" smtClean="0"/>
+              <a:t>” e “Set”.</a:t>
+            </a:r>
+            <a:endParaRPr lang="pt-BR" sz="1200" dirty="0"/>
+          </a:p>
+        </p:txBody>
+      </p:sp>
+      <p:pic>
+        <p:nvPicPr>
+          <p:cNvPr id="5" name="Imagem 4"/>
+          <p:cNvPicPr>
+            <a:picLocks noChangeAspect="1"/>
+          </p:cNvPicPr>
+          <p:nvPr/>
+        </p:nvPicPr>
+        <p:blipFill>
+          <a:blip r:embed="rId3"/>
+          <a:stretch>
+            <a:fillRect/>
+          </a:stretch>
+        </p:blipFill>
+        <p:spPr>
+          <a:xfrm>
+            <a:off x="6256187" y="3142084"/>
+            <a:ext cx="3205505" cy="1056682"/>
+          </a:xfrm>
+          <a:prstGeom prst="rect">
+            <a:avLst/>
+          </a:prstGeom>
+        </p:spPr>
+      </p:pic>
+      <p:pic>
+        <p:nvPicPr>
+          <p:cNvPr id="7" name="Imagem 6"/>
+          <p:cNvPicPr>
+            <a:picLocks noChangeAspect="1"/>
+          </p:cNvPicPr>
+          <p:nvPr/>
+        </p:nvPicPr>
+        <p:blipFill>
+          <a:blip r:embed="rId4"/>
+          <a:stretch>
+            <a:fillRect/>
+          </a:stretch>
+        </p:blipFill>
+        <p:spPr>
+          <a:xfrm>
+            <a:off x="6256187" y="5038165"/>
+            <a:ext cx="4886325" cy="1219200"/>
+          </a:xfrm>
+          <a:prstGeom prst="rect">
+            <a:avLst/>
+          </a:prstGeom>
+        </p:spPr>
+      </p:pic>
+      <p:sp>
+        <p:nvSpPr>
+          <p:cNvPr id="8" name="Seta para Baixo 7"/>
+          <p:cNvSpPr/>
+          <p:nvPr/>
+        </p:nvSpPr>
+        <p:spPr>
+          <a:xfrm>
+            <a:off x="7498080" y="4313816"/>
+            <a:ext cx="462579" cy="567465"/>
+          </a:xfrm>
+          <a:prstGeom prst="downArrow">
+            <a:avLst/>
+          </a:prstGeom>
+        </p:spPr>
+        <p:style>
+          <a:lnRef idx="2">
+            <a:schemeClr val="accent1">
+              <a:shade val="50000"/>
+            </a:schemeClr>
+          </a:lnRef>
+          <a:fillRef idx="1">
+            <a:schemeClr val="accent1"/>
+          </a:fillRef>
+          <a:effectRef idx="0">
+            <a:schemeClr val="accent1"/>
+          </a:effectRef>
+          <a:fontRef idx="minor">
+            <a:schemeClr val="lt1"/>
+          </a:fontRef>
+        </p:style>
+        <p:txBody>
+          <a:bodyPr rtlCol="0" anchor="ctr"/>
+          <a:lstStyle/>
+          <a:p>
+            <a:pPr algn="ctr"/>
+            <a:endParaRPr lang="pt-BR"/>
+          </a:p>
+        </p:txBody>
+      </p:sp>
+      <p:sp>
+        <p:nvSpPr>
+          <p:cNvPr id="9" name="Retângulo 8"/>
+          <p:cNvSpPr/>
+          <p:nvPr/>
+        </p:nvSpPr>
+        <p:spPr>
+          <a:xfrm>
+            <a:off x="8229600" y="4442908"/>
+            <a:ext cx="3872753" cy="438373"/>
+          </a:xfrm>
+          <a:prstGeom prst="rect">
+            <a:avLst/>
+          </a:prstGeom>
+        </p:spPr>
+        <p:style>
+          <a:lnRef idx="2">
+            <a:schemeClr val="accent1">
+              <a:shade val="50000"/>
+            </a:schemeClr>
+          </a:lnRef>
+          <a:fillRef idx="1">
+            <a:schemeClr val="accent1"/>
+          </a:fillRef>
+          <a:effectRef idx="0">
+            <a:schemeClr val="accent1"/>
+          </a:effectRef>
+          <a:fontRef idx="minor">
+            <a:schemeClr val="lt1"/>
+          </a:fontRef>
+        </p:style>
+        <p:txBody>
+          <a:bodyPr rtlCol="0" anchor="ctr"/>
+          <a:lstStyle/>
+          <a:p>
+            <a:pPr algn="ctr"/>
+            <a:r>
+              <a:rPr lang="pt-BR" sz="1000" dirty="0" smtClean="0"/>
+              <a:t>Excel inseriu uma linha (Banco do Vale Total) com a Soma (4000+2073) no local onde houve alteração (De Banco do Vale para Bradesco)</a:t>
+            </a:r>
+            <a:endParaRPr lang="pt-BR" sz="1000" dirty="0"/>
+          </a:p>
+        </p:txBody>
+      </p:sp>
+      <p:cxnSp>
+        <p:nvCxnSpPr>
+          <p:cNvPr id="12" name="Conector Angulado 11"/>
+          <p:cNvCxnSpPr/>
+          <p:nvPr/>
+        </p:nvCxnSpPr>
+        <p:spPr>
+          <a:xfrm>
+            <a:off x="6056554" y="3863978"/>
+            <a:ext cx="4840942" cy="491672"/>
+          </a:xfrm>
+          <a:prstGeom prst="bentConnector3">
+            <a:avLst>
+              <a:gd name="adj1" fmla="val 100000"/>
+            </a:avLst>
+          </a:prstGeom>
+          <a:ln w="25400">
+            <a:solidFill>
+              <a:srgbClr val="FF0000"/>
+            </a:solidFill>
+            <a:tailEnd type="triangle"/>
+          </a:ln>
+        </p:spPr>
+        <p:style>
+          <a:lnRef idx="1">
+            <a:schemeClr val="accent1"/>
+          </a:lnRef>
+          <a:fillRef idx="0">
+            <a:schemeClr val="accent1"/>
+          </a:fillRef>
+          <a:effectRef idx="0">
+            <a:schemeClr val="accent1"/>
+          </a:effectRef>
+          <a:fontRef idx="minor">
+            <a:schemeClr val="tx1"/>
+          </a:fontRef>
+        </p:style>
+      </p:cxnSp>
+      <p:sp>
+        <p:nvSpPr>
+          <p:cNvPr id="20" name="CaixaDeTexto 19"/>
+          <p:cNvSpPr txBox="1"/>
+          <p:nvPr/>
+        </p:nvSpPr>
+        <p:spPr>
+          <a:xfrm>
+            <a:off x="6433073" y="6301578"/>
+            <a:ext cx="570155" cy="369332"/>
+          </a:xfrm>
+          <a:prstGeom prst="rect">
+            <a:avLst/>
+          </a:prstGeom>
+          <a:noFill/>
+        </p:spPr>
+        <p:txBody>
+          <a:bodyPr wrap="square" rtlCol="0">
+            <a:spAutoFit/>
+          </a:bodyPr>
+          <a:lstStyle/>
+          <a:p>
+            <a:r>
+              <a:rPr lang="pt-BR" dirty="0" smtClean="0"/>
+              <a:t>fig1</a:t>
+            </a:r>
+            <a:endParaRPr lang="pt-BR" dirty="0"/>
+          </a:p>
+        </p:txBody>
+      </p:sp>
+    </p:spTree>
+    <p:extLst>
+      <p:ext uri="{BB962C8B-B14F-4D97-AF65-F5344CB8AC3E}">
+        <p14:creationId xmlns:p14="http://schemas.microsoft.com/office/powerpoint/2010/main" val="393180215"/>
+      </p:ext>
+    </p:extLst>
+  </p:cSld>
+  <p:clrMapOvr>
+    <a:masterClrMapping/>
+  </p:clrMapOvr>
+  <p:timing>
+    <p:tnLst>
+      <p:par>
+        <p:cTn id="1" dur="indefinite" restart="never" nodeType="tmRoot"/>
+      </p:par>
+    </p:tnLst>
+  </p:timing>
+</p:sld>
+</file>
+
+<file path=ppt/slides/slide7.xml><?xml version="1.0" encoding="utf-8"?>
+<p:sld xmlns:a="http://schemas.openxmlformats.org/drawingml/2006/main" xmlns:r="http://schemas.openxmlformats.org/officeDocument/2006/relationships" xmlns:p="http://schemas.openxmlformats.org/presentationml/2006/main">
+  <p:cSld>
+    <p:spTree>
+      <p:nvGrpSpPr>
+        <p:cNvPr id="1" name=""/>
+        <p:cNvGrpSpPr/>
+        <p:nvPr/>
+      </p:nvGrpSpPr>
+      <p:grpSpPr>
+        <a:xfrm>
+          <a:off x="0" y="0"/>
+          <a:ext cx="0" cy="0"/>
+          <a:chOff x="0" y="0"/>
+          <a:chExt cx="0" cy="0"/>
+        </a:xfrm>
+      </p:grpSpPr>
+      <p:sp>
+        <p:nvSpPr>
+          <p:cNvPr id="3" name="Subtítulo 1"/>
+          <p:cNvSpPr>
+            <a:spLocks noGrp="1"/>
+          </p:cNvSpPr>
+          <p:nvPr>
+            <p:ph type="subTitle" idx="4294967295"/>
+          </p:nvPr>
+        </p:nvSpPr>
+        <p:spPr>
+          <a:xfrm>
+            <a:off x="585395" y="719695"/>
+            <a:ext cx="10896600" cy="2817812"/>
+          </a:xfrm>
+        </p:spPr>
+        <p:txBody>
+          <a:bodyPr>
+            <a:noAutofit/>
+          </a:bodyPr>
+          <a:lstStyle/>
+          <a:p>
+            <a:pPr marL="0" indent="0">
+              <a:buNone/>
+            </a:pPr>
+            <a:endParaRPr lang="pt-BR" sz="1800" dirty="0" smtClean="0"/>
+          </a:p>
+          <a:p>
+            <a:pPr marL="0" indent="0">
+              <a:buNone/>
+            </a:pPr>
+            <a:r>
+              <a:rPr lang="pt-BR" sz="1800" dirty="0" smtClean="0"/>
+              <a:t>PROCV: busca em uma lista vertical coluna</a:t>
+            </a:r>
+          </a:p>
+        </p:txBody>
+      </p:sp>
+      <p:sp>
+        <p:nvSpPr>
+          <p:cNvPr id="5" name="Subtítulo 1"/>
+          <p:cNvSpPr txBox="1">
+            <a:spLocks/>
+          </p:cNvSpPr>
+          <p:nvPr/>
+        </p:nvSpPr>
+        <p:spPr>
+          <a:xfrm>
+            <a:off x="7005665" y="2128601"/>
+            <a:ext cx="3856784" cy="2271657"/>
+          </a:xfrm>
+          <a:prstGeom prst="rect">
+            <a:avLst/>
+          </a:prstGeom>
+        </p:spPr>
+        <p:txBody>
+          <a:bodyPr vert="horz" lIns="91440" tIns="45720" rIns="91440" bIns="45720" rtlCol="0">
+            <a:noAutofit/>
+          </a:bodyPr>
+          <a:lstStyle>
+            <a:lvl1pPr marL="0" indent="0" algn="ctr" defTabSz="914400" rtl="0" eaLnBrk="1" latinLnBrk="0" hangingPunct="1">
+              <a:lnSpc>
+                <a:spcPct val="90000"/>
+              </a:lnSpc>
+              <a:spcBef>
+                <a:spcPts val="1000"/>
+              </a:spcBef>
+              <a:buFont typeface="Arial" panose="020B0604020202020204" pitchFamily="34" charset="0"/>
+              <a:buNone/>
+              <a:defRPr sz="2400" kern="1200">
+                <a:solidFill>
+                  <a:schemeClr val="tx1"/>
+                </a:solidFill>
+                <a:latin typeface="+mn-lt"/>
+                <a:ea typeface="+mn-ea"/>
+                <a:cs typeface="+mn-cs"/>
+              </a:defRPr>
+            </a:lvl1pPr>
+            <a:lvl2pPr marL="457200" indent="0" algn="ctr" defTabSz="914400" rtl="0" eaLnBrk="1" latinLnBrk="0" hangingPunct="1">
+              <a:lnSpc>
+                <a:spcPct val="90000"/>
+              </a:lnSpc>
+              <a:spcBef>
+                <a:spcPts val="500"/>
+              </a:spcBef>
+              <a:buFont typeface="Arial" panose="020B0604020202020204" pitchFamily="34" charset="0"/>
+              <a:buNone/>
+              <a:defRPr sz="2000" kern="1200">
+                <a:solidFill>
+                  <a:schemeClr val="tx1"/>
+                </a:solidFill>
+                <a:latin typeface="+mn-lt"/>
+                <a:ea typeface="+mn-ea"/>
+                <a:cs typeface="+mn-cs"/>
+              </a:defRPr>
+            </a:lvl2pPr>
+            <a:lvl3pPr marL="914400" indent="0" algn="ctr" defTabSz="914400" rtl="0" eaLnBrk="1" latinLnBrk="0" hangingPunct="1">
+              <a:lnSpc>
+                <a:spcPct val="90000"/>
+              </a:lnSpc>
+              <a:spcBef>
+                <a:spcPts val="500"/>
+              </a:spcBef>
+              <a:buFont typeface="Arial" panose="020B0604020202020204" pitchFamily="34" charset="0"/>
+              <a:buNone/>
+              <a:defRPr sz="1800" kern="1200">
+                <a:solidFill>
+                  <a:schemeClr val="tx1"/>
+                </a:solidFill>
+                <a:latin typeface="+mn-lt"/>
+                <a:ea typeface="+mn-ea"/>
+                <a:cs typeface="+mn-cs"/>
+              </a:defRPr>
+            </a:lvl3pPr>
+            <a:lvl4pPr marL="1371600" indent="0" algn="ctr" defTabSz="914400" rtl="0" eaLnBrk="1" latinLnBrk="0" hangingPunct="1">
+              <a:lnSpc>
+                <a:spcPct val="90000"/>
+              </a:lnSpc>
+              <a:spcBef>
+                <a:spcPts val="500"/>
+              </a:spcBef>
+              <a:buFont typeface="Arial" panose="020B0604020202020204" pitchFamily="34" charset="0"/>
+              <a:buNone/>
+              <a:defRPr sz="1600" kern="1200">
+                <a:solidFill>
+                  <a:schemeClr val="tx1"/>
+                </a:solidFill>
+                <a:latin typeface="+mn-lt"/>
+                <a:ea typeface="+mn-ea"/>
+                <a:cs typeface="+mn-cs"/>
+              </a:defRPr>
+            </a:lvl4pPr>
+            <a:lvl5pPr marL="1828800" indent="0" algn="ctr" defTabSz="914400" rtl="0" eaLnBrk="1" latinLnBrk="0" hangingPunct="1">
+              <a:lnSpc>
+                <a:spcPct val="90000"/>
+              </a:lnSpc>
+              <a:spcBef>
+                <a:spcPts val="500"/>
+              </a:spcBef>
+              <a:buFont typeface="Arial" panose="020B0604020202020204" pitchFamily="34" charset="0"/>
+              <a:buNone/>
+              <a:defRPr sz="1600" kern="1200">
+                <a:solidFill>
+                  <a:schemeClr val="tx1"/>
+                </a:solidFill>
+                <a:latin typeface="+mn-lt"/>
+                <a:ea typeface="+mn-ea"/>
+                <a:cs typeface="+mn-cs"/>
+              </a:defRPr>
+            </a:lvl5pPr>
+            <a:lvl6pPr marL="2286000" indent="0" algn="ctr" defTabSz="914400" rtl="0" eaLnBrk="1" latinLnBrk="0" hangingPunct="1">
+              <a:lnSpc>
+                <a:spcPct val="90000"/>
+              </a:lnSpc>
+              <a:spcBef>
+                <a:spcPts val="500"/>
+              </a:spcBef>
+              <a:buFont typeface="Arial" panose="020B0604020202020204" pitchFamily="34" charset="0"/>
+              <a:buNone/>
+              <a:defRPr sz="1600" kern="1200">
+                <a:solidFill>
+                  <a:schemeClr val="tx1"/>
+                </a:solidFill>
+                <a:latin typeface="+mn-lt"/>
+                <a:ea typeface="+mn-ea"/>
+                <a:cs typeface="+mn-cs"/>
+              </a:defRPr>
+            </a:lvl6pPr>
+            <a:lvl7pPr marL="2743200" indent="0" algn="ctr" defTabSz="914400" rtl="0" eaLnBrk="1" latinLnBrk="0" hangingPunct="1">
+              <a:lnSpc>
+                <a:spcPct val="90000"/>
+              </a:lnSpc>
+              <a:spcBef>
+                <a:spcPts val="500"/>
+              </a:spcBef>
+              <a:buFont typeface="Arial" panose="020B0604020202020204" pitchFamily="34" charset="0"/>
+              <a:buNone/>
+              <a:defRPr sz="1600" kern="1200">
+                <a:solidFill>
+                  <a:schemeClr val="tx1"/>
+                </a:solidFill>
+                <a:latin typeface="+mn-lt"/>
+                <a:ea typeface="+mn-ea"/>
+                <a:cs typeface="+mn-cs"/>
+              </a:defRPr>
+            </a:lvl7pPr>
+            <a:lvl8pPr marL="3200400" indent="0" algn="ctr" defTabSz="914400" rtl="0" eaLnBrk="1" latinLnBrk="0" hangingPunct="1">
+              <a:lnSpc>
+                <a:spcPct val="90000"/>
+              </a:lnSpc>
+              <a:spcBef>
+                <a:spcPts val="500"/>
+              </a:spcBef>
+              <a:buFont typeface="Arial" panose="020B0604020202020204" pitchFamily="34" charset="0"/>
+              <a:buNone/>
+              <a:defRPr sz="1600" kern="1200">
+                <a:solidFill>
+                  <a:schemeClr val="tx1"/>
+                </a:solidFill>
+                <a:latin typeface="+mn-lt"/>
+                <a:ea typeface="+mn-ea"/>
+                <a:cs typeface="+mn-cs"/>
+              </a:defRPr>
+            </a:lvl8pPr>
+            <a:lvl9pPr marL="3657600" indent="0" algn="ctr" defTabSz="914400" rtl="0" eaLnBrk="1" latinLnBrk="0" hangingPunct="1">
+              <a:lnSpc>
+                <a:spcPct val="90000"/>
+              </a:lnSpc>
+              <a:spcBef>
+                <a:spcPts val="500"/>
+              </a:spcBef>
+              <a:buFont typeface="Arial" panose="020B0604020202020204" pitchFamily="34" charset="0"/>
+              <a:buNone/>
+              <a:defRPr sz="1600" kern="1200">
+                <a:solidFill>
+                  <a:schemeClr val="tx1"/>
+                </a:solidFill>
+                <a:latin typeface="+mn-lt"/>
+                <a:ea typeface="+mn-ea"/>
+                <a:cs typeface="+mn-cs"/>
+              </a:defRPr>
+            </a:lvl9pPr>
+          </a:lstStyle>
+          <a:p>
+            <a:endParaRPr lang="pt-BR" sz="1800" dirty="0"/>
+          </a:p>
+          <a:p>
+            <a:r>
+              <a:rPr lang="pt-BR" sz="1800" dirty="0" smtClean="0"/>
+              <a:t>Sempre Leia as informações do assistente de função: elas te ajudarão a  entender como montar fórmulas mais complexas</a:t>
+            </a:r>
+            <a:endParaRPr lang="pt-BR" sz="1800" b="1" dirty="0" smtClean="0">
+              <a:solidFill>
+                <a:srgbClr val="FF0000"/>
+              </a:solidFill>
+            </a:endParaRPr>
+          </a:p>
+          <a:p>
+            <a:endParaRPr lang="pt-BR" sz="1800" dirty="0" smtClean="0"/>
+          </a:p>
+          <a:p>
+            <a:r>
+              <a:rPr lang="pt-BR" sz="1800" dirty="0" smtClean="0"/>
+              <a:t> </a:t>
+            </a:r>
+            <a:endParaRPr lang="pt-BR" sz="1800" dirty="0"/>
+          </a:p>
+        </p:txBody>
+      </p:sp>
+      <p:sp>
+        <p:nvSpPr>
+          <p:cNvPr id="6" name="Subtítulo 2"/>
+          <p:cNvSpPr txBox="1">
+            <a:spLocks/>
+          </p:cNvSpPr>
+          <p:nvPr/>
+        </p:nvSpPr>
+        <p:spPr>
+          <a:xfrm>
+            <a:off x="210670" y="153054"/>
+            <a:ext cx="10058400" cy="718315"/>
+          </a:xfrm>
+        </p:spPr>
+        <p:txBody>
+          <a:bodyPr>
+            <a:noAutofit/>
+          </a:bodyPr>
+          <a:lstStyle>
+            <a:lvl1pPr marL="342900" indent="-342900" algn="l" rtl="0" eaLnBrk="0" fontAlgn="base" hangingPunct="0">
+              <a:spcBef>
+                <a:spcPct val="20000"/>
+              </a:spcBef>
+              <a:spcAft>
+                <a:spcPct val="0"/>
+              </a:spcAft>
+              <a:buFont typeface="Arial" charset="0"/>
+              <a:buChar char="•"/>
+              <a:defRPr lang="pt-BR" sz="2800" kern="1200" dirty="0">
+                <a:solidFill>
+                  <a:schemeClr val="tx1"/>
+                </a:solidFill>
+                <a:latin typeface="+mn-lt"/>
+                <a:ea typeface="+mn-ea"/>
+                <a:cs typeface="+mn-cs"/>
+              </a:defRPr>
+            </a:lvl1pPr>
+            <a:lvl2pPr marL="742950" indent="-285750" algn="l" rtl="0" eaLnBrk="0" fontAlgn="base" hangingPunct="0">
+              <a:spcBef>
+                <a:spcPct val="20000"/>
+              </a:spcBef>
+              <a:spcAft>
+                <a:spcPct val="0"/>
+              </a:spcAft>
+              <a:buFont typeface="Arial" charset="0"/>
+              <a:buChar char="•"/>
+              <a:defRPr lang="pt-BR" sz="2400" kern="1200" dirty="0">
+                <a:solidFill>
+                  <a:schemeClr val="tx1"/>
+                </a:solidFill>
+                <a:latin typeface="+mn-lt"/>
+                <a:ea typeface="+mn-ea"/>
+                <a:cs typeface="+mn-cs"/>
+              </a:defRPr>
+            </a:lvl2pPr>
+            <a:lvl3pPr marL="1143000" indent="-228600" algn="l" rtl="0" eaLnBrk="0" fontAlgn="base" hangingPunct="0">
+              <a:spcBef>
+                <a:spcPct val="20000"/>
+              </a:spcBef>
+              <a:spcAft>
+                <a:spcPct val="0"/>
+              </a:spcAft>
+              <a:buFont typeface="Arial" charset="0"/>
+              <a:buChar char="•"/>
+              <a:defRPr lang="pt-BR" sz="2400" kern="1200" dirty="0">
+                <a:solidFill>
+                  <a:schemeClr val="tx1"/>
+                </a:solidFill>
+                <a:latin typeface="+mn-lt"/>
+                <a:ea typeface="+mn-ea"/>
+                <a:cs typeface="+mn-cs"/>
+              </a:defRPr>
+            </a:lvl3pPr>
+            <a:lvl4pPr marL="1600200" indent="-228600" algn="l" rtl="0" eaLnBrk="0" fontAlgn="base" hangingPunct="0">
+              <a:spcBef>
+                <a:spcPct val="20000"/>
+              </a:spcBef>
+              <a:spcAft>
+                <a:spcPct val="0"/>
+              </a:spcAft>
+              <a:buFont typeface="Arial" charset="0"/>
+              <a:buChar char="•"/>
+              <a:defRPr lang="pt-BR" sz="2000" kern="1200" dirty="0">
+                <a:solidFill>
+                  <a:schemeClr val="tx1"/>
+                </a:solidFill>
+                <a:latin typeface="+mn-lt"/>
+                <a:ea typeface="+mn-ea"/>
+                <a:cs typeface="+mn-cs"/>
+              </a:defRPr>
+            </a:lvl4pPr>
+            <a:lvl5pPr marL="2057400" indent="-228600" algn="l" rtl="0" eaLnBrk="0" fontAlgn="base" hangingPunct="0">
+              <a:spcBef>
+                <a:spcPct val="20000"/>
+              </a:spcBef>
+              <a:spcAft>
+                <a:spcPct val="0"/>
+              </a:spcAft>
+              <a:buFont typeface="Arial" charset="0"/>
+              <a:buChar char="•"/>
+              <a:defRPr lang="pt-BR" sz="2000" kern="1200" dirty="0">
+                <a:solidFill>
+                  <a:schemeClr val="tx1"/>
+                </a:solidFill>
+                <a:latin typeface="+mn-lt"/>
+                <a:ea typeface="+mn-ea"/>
+                <a:cs typeface="+mn-cs"/>
+              </a:defRPr>
+            </a:lvl5pPr>
+            <a:lvl6pPr marL="2514600" indent="-228600" algn="l" defTabSz="914400" rtl="0" eaLnBrk="1" latinLnBrk="0" hangingPunct="1">
+              <a:spcBef>
+                <a:spcPct val="20000"/>
+              </a:spcBef>
+              <a:buFont typeface="Arial" pitchFamily="34" charset="0"/>
+              <a:buChar char="•"/>
+              <a:defRPr sz="2000" kern="1200">
+                <a:solidFill>
+                  <a:schemeClr val="tx1"/>
+                </a:solidFill>
+                <a:latin typeface="+mn-lt"/>
+                <a:ea typeface="+mn-ea"/>
+                <a:cs typeface="+mn-cs"/>
+              </a:defRPr>
+            </a:lvl6pPr>
+            <a:lvl7pPr marL="2971800" indent="-228600" algn="l" defTabSz="914400" rtl="0" eaLnBrk="1" latinLnBrk="0" hangingPunct="1">
+              <a:spcBef>
+                <a:spcPct val="20000"/>
+              </a:spcBef>
+              <a:buFont typeface="Arial" pitchFamily="34" charset="0"/>
+              <a:buChar char="•"/>
+              <a:defRPr sz="2000" kern="1200">
+                <a:solidFill>
+                  <a:schemeClr val="tx1"/>
+                </a:solidFill>
+                <a:latin typeface="+mn-lt"/>
+                <a:ea typeface="+mn-ea"/>
+                <a:cs typeface="+mn-cs"/>
+              </a:defRPr>
+            </a:lvl7pPr>
+            <a:lvl8pPr marL="3429000" indent="-228600" algn="l" defTabSz="914400" rtl="0" eaLnBrk="1" latinLnBrk="0" hangingPunct="1">
+              <a:spcBef>
+                <a:spcPct val="20000"/>
+              </a:spcBef>
+              <a:buFont typeface="Arial" pitchFamily="34" charset="0"/>
+              <a:buChar char="•"/>
+              <a:defRPr sz="2000" kern="1200">
+                <a:solidFill>
+                  <a:schemeClr val="tx1"/>
+                </a:solidFill>
+                <a:latin typeface="+mn-lt"/>
+                <a:ea typeface="+mn-ea"/>
+                <a:cs typeface="+mn-cs"/>
+              </a:defRPr>
+            </a:lvl8pPr>
+            <a:lvl9pPr marL="3886200" indent="-228600" algn="l" defTabSz="914400" rtl="0" eaLnBrk="1" latinLnBrk="0" hangingPunct="1">
+              <a:spcBef>
+                <a:spcPct val="20000"/>
+              </a:spcBef>
+              <a:buFont typeface="Arial" pitchFamily="34" charset="0"/>
+              <a:buChar char="•"/>
+              <a:defRPr sz="2000" kern="1200">
+                <a:solidFill>
+                  <a:schemeClr val="tx1"/>
+                </a:solidFill>
+                <a:latin typeface="+mn-lt"/>
+                <a:ea typeface="+mn-ea"/>
+                <a:cs typeface="+mn-cs"/>
+              </a:defRPr>
+            </a:lvl9pPr>
+          </a:lstStyle>
+          <a:p>
+            <a:pPr marL="0" indent="0">
+              <a:lnSpc>
+                <a:spcPct val="150000"/>
+              </a:lnSpc>
+              <a:buFont typeface="Arial" charset="0"/>
+              <a:buNone/>
+            </a:pPr>
+            <a:r>
+              <a:rPr lang="pt-BR" sz="2400" b="1" dirty="0" smtClean="0">
+                <a:solidFill>
+                  <a:schemeClr val="accent6">
+                    <a:lumMod val="75000"/>
+                  </a:schemeClr>
+                </a:solidFill>
+                <a:latin typeface="Corbel" panose="020B0503020204020204" pitchFamily="34" charset="0"/>
+              </a:rPr>
+              <a:t>Fórmulas de Busca</a:t>
+            </a:r>
+          </a:p>
+        </p:txBody>
+      </p:sp>
+      <p:pic>
+        <p:nvPicPr>
+          <p:cNvPr id="4" name="Imagem 3"/>
+          <p:cNvPicPr>
+            <a:picLocks noChangeAspect="1"/>
+          </p:cNvPicPr>
+          <p:nvPr/>
+        </p:nvPicPr>
+        <p:blipFill>
+          <a:blip r:embed="rId2"/>
+          <a:stretch>
+            <a:fillRect/>
+          </a:stretch>
+        </p:blipFill>
+        <p:spPr>
+          <a:xfrm>
+            <a:off x="585395" y="1795158"/>
+            <a:ext cx="5800725" cy="3181350"/>
+          </a:xfrm>
+          <a:prstGeom prst="rect">
+            <a:avLst/>
+          </a:prstGeom>
+        </p:spPr>
+      </p:pic>
+      <p:sp>
+        <p:nvSpPr>
+          <p:cNvPr id="2" name="Retângulo 1"/>
+          <p:cNvSpPr/>
+          <p:nvPr/>
+        </p:nvSpPr>
+        <p:spPr>
+          <a:xfrm>
+            <a:off x="4216997" y="2257282"/>
+            <a:ext cx="785309" cy="976532"/>
+          </a:xfrm>
+          <a:prstGeom prst="rect">
+            <a:avLst/>
+          </a:prstGeom>
+          <a:noFill/>
+          <a:ln>
+            <a:solidFill>
+              <a:srgbClr val="FF0000"/>
+            </a:solidFill>
+          </a:ln>
+        </p:spPr>
+        <p:style>
+          <a:lnRef idx="2">
+            <a:schemeClr val="accent1">
+              <a:shade val="50000"/>
+            </a:schemeClr>
+          </a:lnRef>
+          <a:fillRef idx="1">
+            <a:schemeClr val="accent1"/>
+          </a:fillRef>
+          <a:effectRef idx="0">
+            <a:schemeClr val="accent1"/>
+          </a:effectRef>
+          <a:fontRef idx="minor">
+            <a:schemeClr val="lt1"/>
+          </a:fontRef>
+        </p:style>
+        <p:txBody>
+          <a:bodyPr rtlCol="0" anchor="ctr"/>
+          <a:lstStyle/>
+          <a:p>
+            <a:pPr algn="ctr"/>
+            <a:endParaRPr lang="pt-BR"/>
+          </a:p>
+        </p:txBody>
+      </p:sp>
+      <p:sp>
+        <p:nvSpPr>
+          <p:cNvPr id="7" name="Retângulo 6"/>
+          <p:cNvSpPr/>
+          <p:nvPr/>
+        </p:nvSpPr>
+        <p:spPr>
+          <a:xfrm>
+            <a:off x="668767" y="3356386"/>
+            <a:ext cx="5717352" cy="848353"/>
+          </a:xfrm>
+          <a:prstGeom prst="rect">
+            <a:avLst/>
+          </a:prstGeom>
+          <a:noFill/>
+          <a:ln>
+            <a:solidFill>
+              <a:srgbClr val="FF0000"/>
+            </a:solidFill>
+          </a:ln>
+        </p:spPr>
+        <p:style>
+          <a:lnRef idx="2">
+            <a:schemeClr val="accent1">
+              <a:shade val="50000"/>
+            </a:schemeClr>
+          </a:lnRef>
+          <a:fillRef idx="1">
+            <a:schemeClr val="accent1"/>
+          </a:fillRef>
+          <a:effectRef idx="0">
+            <a:schemeClr val="accent1"/>
+          </a:effectRef>
+          <a:fontRef idx="minor">
+            <a:schemeClr val="lt1"/>
+          </a:fontRef>
+        </p:style>
+        <p:txBody>
+          <a:bodyPr rtlCol="0" anchor="ctr"/>
+          <a:lstStyle/>
+          <a:p>
+            <a:pPr algn="ctr"/>
+            <a:endParaRPr lang="pt-BR"/>
+          </a:p>
+        </p:txBody>
+      </p:sp>
+      <p:sp>
+        <p:nvSpPr>
+          <p:cNvPr id="8" name="Retângulo 7"/>
+          <p:cNvSpPr/>
+          <p:nvPr/>
+        </p:nvSpPr>
+        <p:spPr>
+          <a:xfrm>
+            <a:off x="624391" y="4282867"/>
+            <a:ext cx="5761728" cy="350720"/>
+          </a:xfrm>
+          <a:prstGeom prst="rect">
+            <a:avLst/>
+          </a:prstGeom>
+          <a:noFill/>
+          <a:ln>
+            <a:solidFill>
+              <a:srgbClr val="FF0000"/>
+            </a:solidFill>
+          </a:ln>
+        </p:spPr>
+        <p:style>
+          <a:lnRef idx="2">
+            <a:schemeClr val="accent1">
+              <a:shade val="50000"/>
+            </a:schemeClr>
+          </a:lnRef>
+          <a:fillRef idx="1">
+            <a:schemeClr val="accent1"/>
+          </a:fillRef>
+          <a:effectRef idx="0">
+            <a:schemeClr val="accent1"/>
+          </a:effectRef>
+          <a:fontRef idx="minor">
+            <a:schemeClr val="lt1"/>
+          </a:fontRef>
+        </p:style>
+        <p:txBody>
+          <a:bodyPr rtlCol="0" anchor="ctr"/>
+          <a:lstStyle/>
+          <a:p>
+            <a:pPr algn="ctr"/>
+            <a:endParaRPr lang="pt-BR"/>
+          </a:p>
+        </p:txBody>
+      </p:sp>
+      <p:pic>
+        <p:nvPicPr>
+          <p:cNvPr id="10" name="Imagem 9"/>
+          <p:cNvPicPr>
+            <a:picLocks noChangeAspect="1"/>
+          </p:cNvPicPr>
+          <p:nvPr/>
+        </p:nvPicPr>
+        <p:blipFill>
+          <a:blip r:embed="rId3"/>
+          <a:stretch>
+            <a:fillRect/>
+          </a:stretch>
+        </p:blipFill>
+        <p:spPr>
+          <a:xfrm>
+            <a:off x="1753683" y="5461971"/>
+            <a:ext cx="8648776" cy="1001274"/>
+          </a:xfrm>
+          <a:prstGeom prst="rect">
+            <a:avLst/>
+          </a:prstGeom>
+        </p:spPr>
+      </p:pic>
+      <p:sp>
+        <p:nvSpPr>
+          <p:cNvPr id="11" name="Elipse 10"/>
+          <p:cNvSpPr/>
+          <p:nvPr/>
+        </p:nvSpPr>
+        <p:spPr>
+          <a:xfrm>
+            <a:off x="10682344" y="5884433"/>
+            <a:ext cx="602428" cy="516367"/>
+          </a:xfrm>
+          <a:prstGeom prst="ellipse">
+            <a:avLst/>
+          </a:prstGeom>
+          <a:solidFill>
+            <a:srgbClr val="92D050"/>
+          </a:solidFill>
+          <a:ln>
+            <a:noFill/>
+          </a:ln>
+        </p:spPr>
+        <p:style>
+          <a:lnRef idx="2">
+            <a:schemeClr val="accent1">
+              <a:shade val="50000"/>
+            </a:schemeClr>
+          </a:lnRef>
+          <a:fillRef idx="1">
+            <a:schemeClr val="accent1"/>
+          </a:fillRef>
+          <a:effectRef idx="0">
+            <a:schemeClr val="accent1"/>
+          </a:effectRef>
+          <a:fontRef idx="minor">
+            <a:schemeClr val="lt1"/>
+          </a:fontRef>
+        </p:style>
+        <p:txBody>
+          <a:bodyPr rtlCol="0" anchor="ctr"/>
+          <a:lstStyle/>
+          <a:p>
+            <a:pPr algn="ctr"/>
+            <a:r>
+              <a:rPr lang="pt-BR" dirty="0" smtClean="0"/>
+              <a:t>51</a:t>
+            </a:r>
+            <a:endParaRPr lang="pt-BR" dirty="0"/>
+          </a:p>
+        </p:txBody>
+      </p:sp>
+    </p:spTree>
+    <p:extLst>
+      <p:ext uri="{BB962C8B-B14F-4D97-AF65-F5344CB8AC3E}">
+        <p14:creationId xmlns:p14="http://schemas.microsoft.com/office/powerpoint/2010/main" val="775853926"/>
+      </p:ext>
+    </p:extLst>
+  </p:cSld>
+  <p:clrMapOvr>
+    <a:masterClrMapping/>
+  </p:clrMapOvr>
+  <p:timing>
+    <p:tnLst>
+      <p:par>
+        <p:cTn id="1" dur="indefinite" restart="never" nodeType="tmRoot"/>
+      </p:par>
+    </p:tnLst>
+  </p:timing>
+</p:sld>
+</file>
+
+<file path=ppt/slides/slide8.xml><?xml version="1.0" encoding="utf-8"?>
+<p:sld xmlns:a="http://schemas.openxmlformats.org/drawingml/2006/main" xmlns:r="http://schemas.openxmlformats.org/officeDocument/2006/relationships" xmlns:p="http://schemas.openxmlformats.org/presentationml/2006/main">
+  <p:cSld>
+    <p:spTree>
+      <p:nvGrpSpPr>
+        <p:cNvPr id="1" name=""/>
+        <p:cNvGrpSpPr/>
+        <p:nvPr/>
+      </p:nvGrpSpPr>
+      <p:grpSpPr>
+        <a:xfrm>
+          <a:off x="0" y="0"/>
+          <a:ext cx="0" cy="0"/>
+          <a:chOff x="0" y="0"/>
+          <a:chExt cx="0" cy="0"/>
+        </a:xfrm>
+      </p:grpSpPr>
+      <p:sp>
+        <p:nvSpPr>
+          <p:cNvPr id="3" name="Subtítulo 1"/>
+          <p:cNvSpPr>
+            <a:spLocks noGrp="1"/>
+          </p:cNvSpPr>
+          <p:nvPr>
+            <p:ph type="subTitle" idx="4294967295"/>
+          </p:nvPr>
+        </p:nvSpPr>
+        <p:spPr>
+          <a:xfrm>
+            <a:off x="585395" y="719695"/>
+            <a:ext cx="10896600" cy="2817812"/>
+          </a:xfrm>
+        </p:spPr>
+        <p:txBody>
+          <a:bodyPr>
+            <a:noAutofit/>
+          </a:bodyPr>
+          <a:lstStyle/>
+          <a:p>
+            <a:pPr marL="0" indent="0">
+              <a:buNone/>
+            </a:pPr>
+            <a:endParaRPr lang="pt-BR" sz="1800" dirty="0" smtClean="0"/>
+          </a:p>
+          <a:p>
+            <a:pPr marL="0" indent="0">
+              <a:buNone/>
+            </a:pPr>
+            <a:r>
+              <a:rPr lang="pt-BR" sz="1800" dirty="0" smtClean="0"/>
+              <a:t>PROCV: busca em uma lista vertical </a:t>
+            </a:r>
+            <a:r>
+              <a:rPr lang="pt-BR" sz="1800" dirty="0" smtClean="0"/>
+              <a:t>(coluna)</a:t>
+            </a:r>
+            <a:endParaRPr lang="pt-BR" sz="1800" dirty="0" smtClean="0"/>
+          </a:p>
+        </p:txBody>
+      </p:sp>
+      <p:sp>
+        <p:nvSpPr>
+          <p:cNvPr id="5" name="Subtítulo 1"/>
+          <p:cNvSpPr txBox="1">
+            <a:spLocks/>
+          </p:cNvSpPr>
+          <p:nvPr/>
+        </p:nvSpPr>
+        <p:spPr>
+          <a:xfrm>
+            <a:off x="387275" y="3070109"/>
+            <a:ext cx="11585986" cy="3040235"/>
+          </a:xfrm>
+          <a:prstGeom prst="rect">
+            <a:avLst/>
+          </a:prstGeom>
+        </p:spPr>
+        <p:txBody>
+          <a:bodyPr vert="horz" lIns="91440" tIns="45720" rIns="91440" bIns="45720" rtlCol="0">
+            <a:noAutofit/>
+          </a:bodyPr>
+          <a:lstStyle>
+            <a:lvl1pPr marL="0" indent="0" algn="ctr" defTabSz="914400" rtl="0" eaLnBrk="1" latinLnBrk="0" hangingPunct="1">
+              <a:lnSpc>
+                <a:spcPct val="90000"/>
+              </a:lnSpc>
+              <a:spcBef>
+                <a:spcPts val="1000"/>
+              </a:spcBef>
+              <a:buFont typeface="Arial" panose="020B0604020202020204" pitchFamily="34" charset="0"/>
+              <a:buNone/>
+              <a:defRPr sz="2400" kern="1200">
+                <a:solidFill>
+                  <a:schemeClr val="tx1"/>
+                </a:solidFill>
+                <a:latin typeface="+mn-lt"/>
+                <a:ea typeface="+mn-ea"/>
+                <a:cs typeface="+mn-cs"/>
+              </a:defRPr>
+            </a:lvl1pPr>
+            <a:lvl2pPr marL="457200" indent="0" algn="ctr" defTabSz="914400" rtl="0" eaLnBrk="1" latinLnBrk="0" hangingPunct="1">
+              <a:lnSpc>
+                <a:spcPct val="90000"/>
+              </a:lnSpc>
+              <a:spcBef>
+                <a:spcPts val="500"/>
+              </a:spcBef>
+              <a:buFont typeface="Arial" panose="020B0604020202020204" pitchFamily="34" charset="0"/>
+              <a:buNone/>
+              <a:defRPr sz="2000" kern="1200">
+                <a:solidFill>
+                  <a:schemeClr val="tx1"/>
+                </a:solidFill>
+                <a:latin typeface="+mn-lt"/>
+                <a:ea typeface="+mn-ea"/>
+                <a:cs typeface="+mn-cs"/>
+              </a:defRPr>
+            </a:lvl2pPr>
+            <a:lvl3pPr marL="914400" indent="0" algn="ctr" defTabSz="914400" rtl="0" eaLnBrk="1" latinLnBrk="0" hangingPunct="1">
+              <a:lnSpc>
+                <a:spcPct val="90000"/>
+              </a:lnSpc>
+              <a:spcBef>
+                <a:spcPts val="500"/>
+              </a:spcBef>
+              <a:buFont typeface="Arial" panose="020B0604020202020204" pitchFamily="34" charset="0"/>
+              <a:buNone/>
+              <a:defRPr sz="1800" kern="1200">
+                <a:solidFill>
+                  <a:schemeClr val="tx1"/>
+                </a:solidFill>
+                <a:latin typeface="+mn-lt"/>
+                <a:ea typeface="+mn-ea"/>
+                <a:cs typeface="+mn-cs"/>
+              </a:defRPr>
+            </a:lvl3pPr>
+            <a:lvl4pPr marL="1371600" indent="0" algn="ctr" defTabSz="914400" rtl="0" eaLnBrk="1" latinLnBrk="0" hangingPunct="1">
+              <a:lnSpc>
+                <a:spcPct val="90000"/>
+              </a:lnSpc>
+              <a:spcBef>
+                <a:spcPts val="500"/>
+              </a:spcBef>
+              <a:buFont typeface="Arial" panose="020B0604020202020204" pitchFamily="34" charset="0"/>
+              <a:buNone/>
+              <a:defRPr sz="1600" kern="1200">
+                <a:solidFill>
+                  <a:schemeClr val="tx1"/>
+                </a:solidFill>
+                <a:latin typeface="+mn-lt"/>
+                <a:ea typeface="+mn-ea"/>
+                <a:cs typeface="+mn-cs"/>
+              </a:defRPr>
+            </a:lvl4pPr>
+            <a:lvl5pPr marL="1828800" indent="0" algn="ctr" defTabSz="914400" rtl="0" eaLnBrk="1" latinLnBrk="0" hangingPunct="1">
+              <a:lnSpc>
+                <a:spcPct val="90000"/>
+              </a:lnSpc>
+              <a:spcBef>
+                <a:spcPts val="500"/>
+              </a:spcBef>
+              <a:buFont typeface="Arial" panose="020B0604020202020204" pitchFamily="34" charset="0"/>
+              <a:buNone/>
+              <a:defRPr sz="1600" kern="1200">
+                <a:solidFill>
+                  <a:schemeClr val="tx1"/>
+                </a:solidFill>
+                <a:latin typeface="+mn-lt"/>
+                <a:ea typeface="+mn-ea"/>
+                <a:cs typeface="+mn-cs"/>
+              </a:defRPr>
+            </a:lvl5pPr>
+            <a:lvl6pPr marL="2286000" indent="0" algn="ctr" defTabSz="914400" rtl="0" eaLnBrk="1" latinLnBrk="0" hangingPunct="1">
+              <a:lnSpc>
+                <a:spcPct val="90000"/>
+              </a:lnSpc>
+              <a:spcBef>
+                <a:spcPts val="500"/>
+              </a:spcBef>
+              <a:buFont typeface="Arial" panose="020B0604020202020204" pitchFamily="34" charset="0"/>
+              <a:buNone/>
+              <a:defRPr sz="1600" kern="1200">
+                <a:solidFill>
+                  <a:schemeClr val="tx1"/>
+                </a:solidFill>
+                <a:latin typeface="+mn-lt"/>
+                <a:ea typeface="+mn-ea"/>
+                <a:cs typeface="+mn-cs"/>
+              </a:defRPr>
+            </a:lvl6pPr>
+            <a:lvl7pPr marL="2743200" indent="0" algn="ctr" defTabSz="914400" rtl="0" eaLnBrk="1" latinLnBrk="0" hangingPunct="1">
+              <a:lnSpc>
+                <a:spcPct val="90000"/>
+              </a:lnSpc>
+              <a:spcBef>
+                <a:spcPts val="500"/>
+              </a:spcBef>
+              <a:buFont typeface="Arial" panose="020B0604020202020204" pitchFamily="34" charset="0"/>
+              <a:buNone/>
+              <a:defRPr sz="1600" kern="1200">
+                <a:solidFill>
+                  <a:schemeClr val="tx1"/>
+                </a:solidFill>
+                <a:latin typeface="+mn-lt"/>
+                <a:ea typeface="+mn-ea"/>
+                <a:cs typeface="+mn-cs"/>
+              </a:defRPr>
+            </a:lvl7pPr>
+            <a:lvl8pPr marL="3200400" indent="0" algn="ctr" defTabSz="914400" rtl="0" eaLnBrk="1" latinLnBrk="0" hangingPunct="1">
+              <a:lnSpc>
+                <a:spcPct val="90000"/>
+              </a:lnSpc>
+              <a:spcBef>
+                <a:spcPts val="500"/>
+              </a:spcBef>
+              <a:buFont typeface="Arial" panose="020B0604020202020204" pitchFamily="34" charset="0"/>
+              <a:buNone/>
+              <a:defRPr sz="1600" kern="1200">
+                <a:solidFill>
+                  <a:schemeClr val="tx1"/>
+                </a:solidFill>
+                <a:latin typeface="+mn-lt"/>
+                <a:ea typeface="+mn-ea"/>
+                <a:cs typeface="+mn-cs"/>
+              </a:defRPr>
+            </a:lvl8pPr>
+            <a:lvl9pPr marL="3657600" indent="0" algn="ctr" defTabSz="914400" rtl="0" eaLnBrk="1" latinLnBrk="0" hangingPunct="1">
+              <a:lnSpc>
+                <a:spcPct val="90000"/>
+              </a:lnSpc>
+              <a:spcBef>
+                <a:spcPts val="500"/>
+              </a:spcBef>
+              <a:buFont typeface="Arial" panose="020B0604020202020204" pitchFamily="34" charset="0"/>
+              <a:buNone/>
+              <a:defRPr sz="1600" kern="1200">
+                <a:solidFill>
+                  <a:schemeClr val="tx1"/>
+                </a:solidFill>
+                <a:latin typeface="+mn-lt"/>
+                <a:ea typeface="+mn-ea"/>
+                <a:cs typeface="+mn-cs"/>
+              </a:defRPr>
+            </a:lvl9pPr>
+          </a:lstStyle>
+          <a:p>
+            <a:r>
+              <a:rPr lang="pt-BR" sz="1800" b="1" u="sng" dirty="0" smtClean="0"/>
+              <a:t>Dicas no Uso de PROCV</a:t>
+            </a:r>
+            <a:endParaRPr lang="pt-BR" sz="1800" b="1" u="sng" dirty="0"/>
+          </a:p>
+          <a:p>
+            <a:pPr marL="285750" indent="-285750" algn="l">
+              <a:buFont typeface="Arial" panose="020B0604020202020204" pitchFamily="34" charset="0"/>
+              <a:buChar char="•"/>
+            </a:pPr>
+            <a:r>
+              <a:rPr lang="pt-BR" sz="1800" dirty="0"/>
+              <a:t>Sempre CONGELE a referência no argumento “MATRIZ TABELA” (selecione a pressione F4)</a:t>
+            </a:r>
+            <a:endParaRPr lang="pt-BR" sz="1800" b="1" dirty="0">
+              <a:solidFill>
+                <a:srgbClr val="FF0000"/>
+              </a:solidFill>
+            </a:endParaRPr>
+          </a:p>
+          <a:p>
+            <a:pPr marL="285750" indent="-285750" algn="l">
+              <a:buFont typeface="Arial" panose="020B0604020202020204" pitchFamily="34" charset="0"/>
+              <a:buChar char="•"/>
+            </a:pPr>
+            <a:r>
+              <a:rPr lang="pt-BR" sz="1800" dirty="0" smtClean="0"/>
+              <a:t>Argumento “</a:t>
+            </a:r>
+            <a:r>
+              <a:rPr lang="pt-BR" sz="1800" dirty="0" err="1" smtClean="0"/>
+              <a:t>Num_Indice</a:t>
+            </a:r>
+            <a:r>
+              <a:rPr lang="pt-BR" sz="1800" dirty="0" smtClean="0"/>
+              <a:t> Coluna”/ </a:t>
+            </a:r>
+            <a:r>
+              <a:rPr lang="pt-BR" sz="1800" dirty="0" err="1" smtClean="0"/>
+              <a:t>Nºda</a:t>
+            </a:r>
+            <a:r>
+              <a:rPr lang="pt-BR" sz="1800" dirty="0" smtClean="0"/>
+              <a:t> Coluna: pode ser apontado para uma célula que contem a posição  da coluna (referencia externa à formula).</a:t>
+            </a:r>
+          </a:p>
+          <a:p>
+            <a:pPr marL="285750" indent="-285750" algn="l">
+              <a:buFont typeface="Arial" panose="020B0604020202020204" pitchFamily="34" charset="0"/>
+              <a:buChar char="•"/>
+            </a:pPr>
+            <a:r>
+              <a:rPr lang="pt-BR" sz="1800" dirty="0" smtClean="0"/>
+              <a:t>O Argumento de procurar intervalo:</a:t>
+            </a:r>
+          </a:p>
+          <a:p>
+            <a:pPr algn="l"/>
+            <a:r>
+              <a:rPr lang="pt-BR" sz="1800" dirty="0" smtClean="0"/>
+              <a:t>	Parâmetro Falso pode ser substituído por “0”: será usado em 90% dos casos (casos onde procuro um CODIGO)</a:t>
+            </a:r>
+          </a:p>
+          <a:p>
+            <a:pPr algn="l"/>
+            <a:r>
+              <a:rPr lang="pt-BR" sz="1800" dirty="0" smtClean="0"/>
+              <a:t>	Parâmetro VERDADEIRO pode ser substituído na digitação por “1”: usado em apurações de comissão (procuro 	um intervalo).</a:t>
+            </a:r>
+          </a:p>
+          <a:p>
+            <a:pPr algn="l"/>
+            <a:endParaRPr lang="pt-BR" sz="1800" dirty="0"/>
+          </a:p>
+          <a:p>
+            <a:endParaRPr lang="pt-BR" sz="1800" dirty="0" smtClean="0"/>
+          </a:p>
+          <a:p>
+            <a:r>
+              <a:rPr lang="pt-BR" sz="1800" dirty="0" smtClean="0"/>
+              <a:t> </a:t>
+            </a:r>
+            <a:endParaRPr lang="pt-BR" sz="1800" dirty="0"/>
+          </a:p>
+        </p:txBody>
+      </p:sp>
+      <p:sp>
+        <p:nvSpPr>
+          <p:cNvPr id="6" name="Subtítulo 2"/>
+          <p:cNvSpPr txBox="1">
+            <a:spLocks/>
+          </p:cNvSpPr>
+          <p:nvPr/>
+        </p:nvSpPr>
+        <p:spPr>
+          <a:xfrm>
+            <a:off x="210670" y="153054"/>
+            <a:ext cx="10058400" cy="718315"/>
+          </a:xfrm>
+        </p:spPr>
+        <p:txBody>
+          <a:bodyPr>
+            <a:noAutofit/>
+          </a:bodyPr>
+          <a:lstStyle>
+            <a:lvl1pPr marL="342900" indent="-342900" algn="l" rtl="0" eaLnBrk="0" fontAlgn="base" hangingPunct="0">
+              <a:spcBef>
+                <a:spcPct val="20000"/>
+              </a:spcBef>
+              <a:spcAft>
+                <a:spcPct val="0"/>
+              </a:spcAft>
+              <a:buFont typeface="Arial" charset="0"/>
+              <a:buChar char="•"/>
+              <a:defRPr lang="pt-BR" sz="2800" kern="1200" dirty="0">
+                <a:solidFill>
+                  <a:schemeClr val="tx1"/>
+                </a:solidFill>
+                <a:latin typeface="+mn-lt"/>
+                <a:ea typeface="+mn-ea"/>
+                <a:cs typeface="+mn-cs"/>
+              </a:defRPr>
+            </a:lvl1pPr>
+            <a:lvl2pPr marL="742950" indent="-285750" algn="l" rtl="0" eaLnBrk="0" fontAlgn="base" hangingPunct="0">
+              <a:spcBef>
+                <a:spcPct val="20000"/>
+              </a:spcBef>
+              <a:spcAft>
+                <a:spcPct val="0"/>
+              </a:spcAft>
+              <a:buFont typeface="Arial" charset="0"/>
+              <a:buChar char="•"/>
+              <a:defRPr lang="pt-BR" sz="2400" kern="1200" dirty="0">
+                <a:solidFill>
+                  <a:schemeClr val="tx1"/>
+                </a:solidFill>
+                <a:latin typeface="+mn-lt"/>
+                <a:ea typeface="+mn-ea"/>
+                <a:cs typeface="+mn-cs"/>
+              </a:defRPr>
+            </a:lvl2pPr>
+            <a:lvl3pPr marL="1143000" indent="-228600" algn="l" rtl="0" eaLnBrk="0" fontAlgn="base" hangingPunct="0">
+              <a:spcBef>
+                <a:spcPct val="20000"/>
+              </a:spcBef>
+              <a:spcAft>
+                <a:spcPct val="0"/>
+              </a:spcAft>
+              <a:buFont typeface="Arial" charset="0"/>
+              <a:buChar char="•"/>
+              <a:defRPr lang="pt-BR" sz="2400" kern="1200" dirty="0">
+                <a:solidFill>
+                  <a:schemeClr val="tx1"/>
+                </a:solidFill>
+                <a:latin typeface="+mn-lt"/>
+                <a:ea typeface="+mn-ea"/>
+                <a:cs typeface="+mn-cs"/>
+              </a:defRPr>
+            </a:lvl3pPr>
+            <a:lvl4pPr marL="1600200" indent="-228600" algn="l" rtl="0" eaLnBrk="0" fontAlgn="base" hangingPunct="0">
+              <a:spcBef>
+                <a:spcPct val="20000"/>
+              </a:spcBef>
+              <a:spcAft>
+                <a:spcPct val="0"/>
+              </a:spcAft>
+              <a:buFont typeface="Arial" charset="0"/>
+              <a:buChar char="•"/>
+              <a:defRPr lang="pt-BR" sz="2000" kern="1200" dirty="0">
+                <a:solidFill>
+                  <a:schemeClr val="tx1"/>
+                </a:solidFill>
+                <a:latin typeface="+mn-lt"/>
+                <a:ea typeface="+mn-ea"/>
+                <a:cs typeface="+mn-cs"/>
+              </a:defRPr>
+            </a:lvl4pPr>
+            <a:lvl5pPr marL="2057400" indent="-228600" algn="l" rtl="0" eaLnBrk="0" fontAlgn="base" hangingPunct="0">
+              <a:spcBef>
+                <a:spcPct val="20000"/>
+              </a:spcBef>
+              <a:spcAft>
+                <a:spcPct val="0"/>
+              </a:spcAft>
+              <a:buFont typeface="Arial" charset="0"/>
+              <a:buChar char="•"/>
+              <a:defRPr lang="pt-BR" sz="2000" kern="1200" dirty="0">
+                <a:solidFill>
+                  <a:schemeClr val="tx1"/>
+                </a:solidFill>
+                <a:latin typeface="+mn-lt"/>
+                <a:ea typeface="+mn-ea"/>
+                <a:cs typeface="+mn-cs"/>
+              </a:defRPr>
+            </a:lvl5pPr>
+            <a:lvl6pPr marL="2514600" indent="-228600" algn="l" defTabSz="914400" rtl="0" eaLnBrk="1" latinLnBrk="0" hangingPunct="1">
+              <a:spcBef>
+                <a:spcPct val="20000"/>
+              </a:spcBef>
+              <a:buFont typeface="Arial" pitchFamily="34" charset="0"/>
+              <a:buChar char="•"/>
+              <a:defRPr sz="2000" kern="1200">
+                <a:solidFill>
+                  <a:schemeClr val="tx1"/>
+                </a:solidFill>
+                <a:latin typeface="+mn-lt"/>
+                <a:ea typeface="+mn-ea"/>
+                <a:cs typeface="+mn-cs"/>
+              </a:defRPr>
+            </a:lvl6pPr>
+            <a:lvl7pPr marL="2971800" indent="-228600" algn="l" defTabSz="914400" rtl="0" eaLnBrk="1" latinLnBrk="0" hangingPunct="1">
+              <a:spcBef>
+                <a:spcPct val="20000"/>
+              </a:spcBef>
+              <a:buFont typeface="Arial" pitchFamily="34" charset="0"/>
+              <a:buChar char="•"/>
+              <a:defRPr sz="2000" kern="1200">
+                <a:solidFill>
+                  <a:schemeClr val="tx1"/>
+                </a:solidFill>
+                <a:latin typeface="+mn-lt"/>
+                <a:ea typeface="+mn-ea"/>
+                <a:cs typeface="+mn-cs"/>
+              </a:defRPr>
+            </a:lvl7pPr>
+            <a:lvl8pPr marL="3429000" indent="-228600" algn="l" defTabSz="914400" rtl="0" eaLnBrk="1" latinLnBrk="0" hangingPunct="1">
+              <a:spcBef>
+                <a:spcPct val="20000"/>
+              </a:spcBef>
+              <a:buFont typeface="Arial" pitchFamily="34" charset="0"/>
+              <a:buChar char="•"/>
+              <a:defRPr sz="2000" kern="1200">
+                <a:solidFill>
+                  <a:schemeClr val="tx1"/>
+                </a:solidFill>
+                <a:latin typeface="+mn-lt"/>
+                <a:ea typeface="+mn-ea"/>
+                <a:cs typeface="+mn-cs"/>
+              </a:defRPr>
+            </a:lvl8pPr>
+            <a:lvl9pPr marL="3886200" indent="-228600" algn="l" defTabSz="914400" rtl="0" eaLnBrk="1" latinLnBrk="0" hangingPunct="1">
+              <a:spcBef>
+                <a:spcPct val="20000"/>
+              </a:spcBef>
+              <a:buFont typeface="Arial" pitchFamily="34" charset="0"/>
+              <a:buChar char="•"/>
+              <a:defRPr sz="2000" kern="1200">
+                <a:solidFill>
+                  <a:schemeClr val="tx1"/>
+                </a:solidFill>
+                <a:latin typeface="+mn-lt"/>
+                <a:ea typeface="+mn-ea"/>
+                <a:cs typeface="+mn-cs"/>
+              </a:defRPr>
+            </a:lvl9pPr>
+          </a:lstStyle>
+          <a:p>
+            <a:pPr marL="0" indent="0">
+              <a:lnSpc>
+                <a:spcPct val="150000"/>
+              </a:lnSpc>
+              <a:buFont typeface="Arial" charset="0"/>
+              <a:buNone/>
+            </a:pPr>
+            <a:r>
+              <a:rPr lang="pt-BR" sz="2400" b="1" dirty="0" smtClean="0">
+                <a:solidFill>
+                  <a:schemeClr val="accent6">
+                    <a:lumMod val="75000"/>
+                  </a:schemeClr>
+                </a:solidFill>
+                <a:latin typeface="Corbel" panose="020B0503020204020204" pitchFamily="34" charset="0"/>
+              </a:rPr>
+              <a:t>Fórmulas de Busca</a:t>
+            </a:r>
+          </a:p>
+        </p:txBody>
+      </p:sp>
+      <p:pic>
+        <p:nvPicPr>
+          <p:cNvPr id="10" name="Imagem 9"/>
+          <p:cNvPicPr>
+            <a:picLocks noChangeAspect="1"/>
+          </p:cNvPicPr>
+          <p:nvPr/>
+        </p:nvPicPr>
+        <p:blipFill>
+          <a:blip r:embed="rId2"/>
+          <a:stretch>
+            <a:fillRect/>
+          </a:stretch>
+        </p:blipFill>
+        <p:spPr>
+          <a:xfrm>
+            <a:off x="285281" y="1522680"/>
+            <a:ext cx="8648776" cy="1001274"/>
+          </a:xfrm>
+          <a:prstGeom prst="rect">
+            <a:avLst/>
+          </a:prstGeom>
+        </p:spPr>
+      </p:pic>
+      <p:sp>
+        <p:nvSpPr>
+          <p:cNvPr id="11" name="Elipse 10"/>
+          <p:cNvSpPr/>
+          <p:nvPr/>
+        </p:nvSpPr>
+        <p:spPr>
+          <a:xfrm>
+            <a:off x="10682344" y="5884433"/>
+            <a:ext cx="602428" cy="516367"/>
+          </a:xfrm>
+          <a:prstGeom prst="ellipse">
+            <a:avLst/>
+          </a:prstGeom>
+          <a:solidFill>
+            <a:srgbClr val="92D050"/>
+          </a:solidFill>
+          <a:ln>
+            <a:noFill/>
+          </a:ln>
+        </p:spPr>
+        <p:style>
+          <a:lnRef idx="2">
+            <a:schemeClr val="accent1">
+              <a:shade val="50000"/>
+            </a:schemeClr>
+          </a:lnRef>
+          <a:fillRef idx="1">
+            <a:schemeClr val="accent1"/>
+          </a:fillRef>
+          <a:effectRef idx="0">
+            <a:schemeClr val="accent1"/>
+          </a:effectRef>
+          <a:fontRef idx="minor">
+            <a:schemeClr val="lt1"/>
+          </a:fontRef>
+        </p:style>
+        <p:txBody>
+          <a:bodyPr rtlCol="0" anchor="ctr"/>
+          <a:lstStyle/>
+          <a:p>
+            <a:pPr algn="ctr"/>
+            <a:r>
+              <a:rPr lang="pt-BR" dirty="0" smtClean="0"/>
+              <a:t>51</a:t>
+            </a:r>
+            <a:endParaRPr lang="pt-BR" dirty="0"/>
+          </a:p>
+        </p:txBody>
+      </p:sp>
+    </p:spTree>
+    <p:extLst>
+      <p:ext uri="{BB962C8B-B14F-4D97-AF65-F5344CB8AC3E}">
+        <p14:creationId xmlns:p14="http://schemas.microsoft.com/office/powerpoint/2010/main" val="4197545501"/>
+      </p:ext>
+    </p:extLst>
+  </p:cSld>
+  <p:clrMapOvr>
+    <a:masterClrMapping/>
+  </p:clrMapOvr>
+  <p:timing>
+    <p:tnLst>
+      <p:par>
+        <p:cTn id="1" dur="indefinite" restart="never" nodeType="tmRoot"/>
+      </p:par>
+    </p:tnLst>
+  </p:timing>
+</p:sld>
+</file>
+
+<file path=ppt/slides/slide9.xml><?xml version="1.0" encoding="utf-8"?>
+<p:sld xmlns:a="http://schemas.openxmlformats.org/drawingml/2006/main" xmlns:r="http://schemas.openxmlformats.org/officeDocument/2006/relationships" xmlns:p="http://schemas.openxmlformats.org/presentationml/2006/main">
+  <p:cSld>
+    <p:spTree>
+      <p:nvGrpSpPr>
+        <p:cNvPr id="1" name=""/>
+        <p:cNvGrpSpPr/>
+        <p:nvPr/>
+      </p:nvGrpSpPr>
+      <p:grpSpPr>
+        <a:xfrm>
+          <a:off x="0" y="0"/>
+          <a:ext cx="0" cy="0"/>
+          <a:chOff x="0" y="0"/>
+          <a:chExt cx="0" cy="0"/>
+        </a:xfrm>
+      </p:grpSpPr>
+      <p:sp>
+        <p:nvSpPr>
+          <p:cNvPr id="6" name="Subtítulo 2"/>
+          <p:cNvSpPr txBox="1">
+            <a:spLocks/>
+          </p:cNvSpPr>
+          <p:nvPr/>
+        </p:nvSpPr>
+        <p:spPr>
+          <a:xfrm>
+            <a:off x="210670" y="153054"/>
+            <a:ext cx="10058400" cy="718315"/>
+          </a:xfrm>
+        </p:spPr>
+        <p:txBody>
+          <a:bodyPr>
+            <a:noAutofit/>
+          </a:bodyPr>
+          <a:lstStyle>
+            <a:lvl1pPr marL="342900" indent="-342900" algn="l" rtl="0" eaLnBrk="0" fontAlgn="base" hangingPunct="0">
+              <a:spcBef>
+                <a:spcPct val="20000"/>
+              </a:spcBef>
+              <a:spcAft>
+                <a:spcPct val="0"/>
+              </a:spcAft>
+              <a:buFont typeface="Arial" charset="0"/>
+              <a:buChar char="•"/>
+              <a:defRPr lang="pt-BR" sz="2800" kern="1200" dirty="0">
+                <a:solidFill>
+                  <a:schemeClr val="tx1"/>
+                </a:solidFill>
+                <a:latin typeface="+mn-lt"/>
+                <a:ea typeface="+mn-ea"/>
+                <a:cs typeface="+mn-cs"/>
+              </a:defRPr>
+            </a:lvl1pPr>
+            <a:lvl2pPr marL="742950" indent="-285750" algn="l" rtl="0" eaLnBrk="0" fontAlgn="base" hangingPunct="0">
+              <a:spcBef>
+                <a:spcPct val="20000"/>
+              </a:spcBef>
+              <a:spcAft>
+                <a:spcPct val="0"/>
+              </a:spcAft>
+              <a:buFont typeface="Arial" charset="0"/>
+              <a:buChar char="•"/>
+              <a:defRPr lang="pt-BR" sz="2400" kern="1200" dirty="0">
+                <a:solidFill>
+                  <a:schemeClr val="tx1"/>
+                </a:solidFill>
+                <a:latin typeface="+mn-lt"/>
+                <a:ea typeface="+mn-ea"/>
+                <a:cs typeface="+mn-cs"/>
+              </a:defRPr>
+            </a:lvl2pPr>
+            <a:lvl3pPr marL="1143000" indent="-228600" algn="l" rtl="0" eaLnBrk="0" fontAlgn="base" hangingPunct="0">
+              <a:spcBef>
+                <a:spcPct val="20000"/>
+              </a:spcBef>
+              <a:spcAft>
+                <a:spcPct val="0"/>
+              </a:spcAft>
+              <a:buFont typeface="Arial" charset="0"/>
+              <a:buChar char="•"/>
+              <a:defRPr lang="pt-BR" sz="2400" kern="1200" dirty="0">
+                <a:solidFill>
+                  <a:schemeClr val="tx1"/>
+                </a:solidFill>
+                <a:latin typeface="+mn-lt"/>
+                <a:ea typeface="+mn-ea"/>
+                <a:cs typeface="+mn-cs"/>
+              </a:defRPr>
+            </a:lvl3pPr>
+            <a:lvl4pPr marL="1600200" indent="-228600" algn="l" rtl="0" eaLnBrk="0" fontAlgn="base" hangingPunct="0">
+              <a:spcBef>
+                <a:spcPct val="20000"/>
+              </a:spcBef>
+              <a:spcAft>
+                <a:spcPct val="0"/>
+              </a:spcAft>
+              <a:buFont typeface="Arial" charset="0"/>
+              <a:buChar char="•"/>
+              <a:defRPr lang="pt-BR" sz="2000" kern="1200" dirty="0">
+                <a:solidFill>
+                  <a:schemeClr val="tx1"/>
+                </a:solidFill>
+                <a:latin typeface="+mn-lt"/>
+                <a:ea typeface="+mn-ea"/>
+                <a:cs typeface="+mn-cs"/>
+              </a:defRPr>
+            </a:lvl4pPr>
+            <a:lvl5pPr marL="2057400" indent="-228600" algn="l" rtl="0" eaLnBrk="0" fontAlgn="base" hangingPunct="0">
+              <a:spcBef>
+                <a:spcPct val="20000"/>
+              </a:spcBef>
+              <a:spcAft>
+                <a:spcPct val="0"/>
+              </a:spcAft>
+              <a:buFont typeface="Arial" charset="0"/>
+              <a:buChar char="•"/>
+              <a:defRPr lang="pt-BR" sz="2000" kern="1200" dirty="0">
+                <a:solidFill>
+                  <a:schemeClr val="tx1"/>
+                </a:solidFill>
+                <a:latin typeface="+mn-lt"/>
+                <a:ea typeface="+mn-ea"/>
+                <a:cs typeface="+mn-cs"/>
+              </a:defRPr>
+            </a:lvl5pPr>
+            <a:lvl6pPr marL="2514600" indent="-228600" algn="l" defTabSz="914400" rtl="0" eaLnBrk="1" latinLnBrk="0" hangingPunct="1">
+              <a:spcBef>
+                <a:spcPct val="20000"/>
+              </a:spcBef>
+              <a:buFont typeface="Arial" pitchFamily="34" charset="0"/>
+              <a:buChar char="•"/>
+              <a:defRPr sz="2000" kern="1200">
+                <a:solidFill>
+                  <a:schemeClr val="tx1"/>
+                </a:solidFill>
+                <a:latin typeface="+mn-lt"/>
+                <a:ea typeface="+mn-ea"/>
+                <a:cs typeface="+mn-cs"/>
+              </a:defRPr>
+            </a:lvl6pPr>
+            <a:lvl7pPr marL="2971800" indent="-228600" algn="l" defTabSz="914400" rtl="0" eaLnBrk="1" latinLnBrk="0" hangingPunct="1">
+              <a:spcBef>
+                <a:spcPct val="20000"/>
+              </a:spcBef>
+              <a:buFont typeface="Arial" pitchFamily="34" charset="0"/>
+              <a:buChar char="•"/>
+              <a:defRPr sz="2000" kern="1200">
+                <a:solidFill>
+                  <a:schemeClr val="tx1"/>
+                </a:solidFill>
+                <a:latin typeface="+mn-lt"/>
+                <a:ea typeface="+mn-ea"/>
+                <a:cs typeface="+mn-cs"/>
+              </a:defRPr>
+            </a:lvl7pPr>
+            <a:lvl8pPr marL="3429000" indent="-228600" algn="l" defTabSz="914400" rtl="0" eaLnBrk="1" latinLnBrk="0" hangingPunct="1">
+              <a:spcBef>
+                <a:spcPct val="20000"/>
+              </a:spcBef>
+              <a:buFont typeface="Arial" pitchFamily="34" charset="0"/>
+              <a:buChar char="•"/>
+              <a:defRPr sz="2000" kern="1200">
+                <a:solidFill>
+                  <a:schemeClr val="tx1"/>
+                </a:solidFill>
+                <a:latin typeface="+mn-lt"/>
+                <a:ea typeface="+mn-ea"/>
+                <a:cs typeface="+mn-cs"/>
+              </a:defRPr>
+            </a:lvl8pPr>
+            <a:lvl9pPr marL="3886200" indent="-228600" algn="l" defTabSz="914400" rtl="0" eaLnBrk="1" latinLnBrk="0" hangingPunct="1">
+              <a:spcBef>
+                <a:spcPct val="20000"/>
+              </a:spcBef>
+              <a:buFont typeface="Arial" pitchFamily="34" charset="0"/>
+              <a:buChar char="•"/>
+              <a:defRPr sz="2000" kern="1200">
+                <a:solidFill>
+                  <a:schemeClr val="tx1"/>
+                </a:solidFill>
+                <a:latin typeface="+mn-lt"/>
+                <a:ea typeface="+mn-ea"/>
+                <a:cs typeface="+mn-cs"/>
+              </a:defRPr>
+            </a:lvl9pPr>
+          </a:lstStyle>
+          <a:p>
+            <a:pPr marL="0" indent="0">
+              <a:lnSpc>
+                <a:spcPct val="150000"/>
+              </a:lnSpc>
+              <a:buFont typeface="Arial" charset="0"/>
+              <a:buNone/>
+            </a:pPr>
+            <a:r>
+              <a:rPr lang="pt-BR" sz="2400" b="1" dirty="0" smtClean="0">
+                <a:solidFill>
+                  <a:schemeClr val="accent6">
+                    <a:lumMod val="75000"/>
+                  </a:schemeClr>
+                </a:solidFill>
+                <a:latin typeface="Corbel" panose="020B0503020204020204" pitchFamily="34" charset="0"/>
+              </a:rPr>
+              <a:t>Alto Volume de Dados  - Banco de Dados em TXT</a:t>
+            </a:r>
+          </a:p>
+        </p:txBody>
+      </p:sp>
+      <p:sp>
+        <p:nvSpPr>
+          <p:cNvPr id="11" name="Subtítulo 1"/>
+          <p:cNvSpPr txBox="1">
+            <a:spLocks/>
+          </p:cNvSpPr>
+          <p:nvPr/>
+        </p:nvSpPr>
+        <p:spPr>
+          <a:xfrm>
+            <a:off x="531607" y="1106970"/>
+            <a:ext cx="10896600" cy="2817812"/>
+          </a:xfrm>
+        </p:spPr>
+        <p:txBody>
+          <a:bodyPr>
+            <a:noAutofit/>
+          </a:bodyPr>
+          <a:lstStyle>
+            <a:lvl1pPr marL="342900" indent="-342900" algn="l" rtl="0" eaLnBrk="0" fontAlgn="base" hangingPunct="0">
+              <a:spcBef>
+                <a:spcPct val="20000"/>
+              </a:spcBef>
+              <a:spcAft>
+                <a:spcPct val="0"/>
+              </a:spcAft>
+              <a:buFont typeface="Arial" charset="0"/>
+              <a:buChar char="•"/>
+              <a:defRPr lang="pt-BR" sz="2800" kern="1200" dirty="0">
+                <a:solidFill>
+                  <a:schemeClr val="tx1"/>
+                </a:solidFill>
+                <a:latin typeface="+mn-lt"/>
+                <a:ea typeface="+mn-ea"/>
+                <a:cs typeface="+mn-cs"/>
+              </a:defRPr>
+            </a:lvl1pPr>
+            <a:lvl2pPr marL="742950" indent="-285750" algn="l" rtl="0" eaLnBrk="0" fontAlgn="base" hangingPunct="0">
+              <a:spcBef>
+                <a:spcPct val="20000"/>
+              </a:spcBef>
+              <a:spcAft>
+                <a:spcPct val="0"/>
+              </a:spcAft>
+              <a:buFont typeface="Arial" charset="0"/>
+              <a:buChar char="•"/>
+              <a:defRPr lang="pt-BR" sz="2400" kern="1200" dirty="0">
+                <a:solidFill>
+                  <a:schemeClr val="tx1"/>
+                </a:solidFill>
+                <a:latin typeface="+mn-lt"/>
+                <a:ea typeface="+mn-ea"/>
+                <a:cs typeface="+mn-cs"/>
+              </a:defRPr>
+            </a:lvl2pPr>
+            <a:lvl3pPr marL="1143000" indent="-228600" algn="l" rtl="0" eaLnBrk="0" fontAlgn="base" hangingPunct="0">
+              <a:spcBef>
+                <a:spcPct val="20000"/>
+              </a:spcBef>
+              <a:spcAft>
+                <a:spcPct val="0"/>
+              </a:spcAft>
+              <a:buFont typeface="Arial" charset="0"/>
+              <a:buChar char="•"/>
+              <a:defRPr lang="pt-BR" sz="2400" kern="1200" dirty="0">
+                <a:solidFill>
+                  <a:schemeClr val="tx1"/>
+                </a:solidFill>
+                <a:latin typeface="+mn-lt"/>
+                <a:ea typeface="+mn-ea"/>
+                <a:cs typeface="+mn-cs"/>
+              </a:defRPr>
+            </a:lvl3pPr>
+            <a:lvl4pPr marL="1600200" indent="-228600" algn="l" rtl="0" eaLnBrk="0" fontAlgn="base" hangingPunct="0">
+              <a:spcBef>
+                <a:spcPct val="20000"/>
+              </a:spcBef>
+              <a:spcAft>
+                <a:spcPct val="0"/>
+              </a:spcAft>
+              <a:buFont typeface="Arial" charset="0"/>
+              <a:buChar char="•"/>
+              <a:defRPr lang="pt-BR" sz="2000" kern="1200" dirty="0">
+                <a:solidFill>
+                  <a:schemeClr val="tx1"/>
+                </a:solidFill>
+                <a:latin typeface="+mn-lt"/>
+                <a:ea typeface="+mn-ea"/>
+                <a:cs typeface="+mn-cs"/>
+              </a:defRPr>
+            </a:lvl4pPr>
+            <a:lvl5pPr marL="2057400" indent="-228600" algn="l" rtl="0" eaLnBrk="0" fontAlgn="base" hangingPunct="0">
+              <a:spcBef>
+                <a:spcPct val="20000"/>
+              </a:spcBef>
+              <a:spcAft>
+                <a:spcPct val="0"/>
+              </a:spcAft>
+              <a:buFont typeface="Arial" charset="0"/>
+              <a:buChar char="•"/>
+              <a:defRPr lang="pt-BR" sz="2000" kern="1200" dirty="0">
+                <a:solidFill>
+                  <a:schemeClr val="tx1"/>
+                </a:solidFill>
+                <a:latin typeface="+mn-lt"/>
+                <a:ea typeface="+mn-ea"/>
+                <a:cs typeface="+mn-cs"/>
+              </a:defRPr>
+            </a:lvl5pPr>
+            <a:lvl6pPr marL="2514600" indent="-228600" algn="l" defTabSz="914400" rtl="0" eaLnBrk="1" latinLnBrk="0" hangingPunct="1">
+              <a:spcBef>
+                <a:spcPct val="20000"/>
+              </a:spcBef>
+              <a:buFont typeface="Arial" pitchFamily="34" charset="0"/>
+              <a:buChar char="•"/>
+              <a:defRPr sz="2000" kern="1200">
+                <a:solidFill>
+                  <a:schemeClr val="tx1"/>
+                </a:solidFill>
+                <a:latin typeface="+mn-lt"/>
+                <a:ea typeface="+mn-ea"/>
+                <a:cs typeface="+mn-cs"/>
+              </a:defRPr>
+            </a:lvl6pPr>
+            <a:lvl7pPr marL="2971800" indent="-228600" algn="l" defTabSz="914400" rtl="0" eaLnBrk="1" latinLnBrk="0" hangingPunct="1">
+              <a:spcBef>
+                <a:spcPct val="20000"/>
+              </a:spcBef>
+              <a:buFont typeface="Arial" pitchFamily="34" charset="0"/>
+              <a:buChar char="•"/>
+              <a:defRPr sz="2000" kern="1200">
+                <a:solidFill>
+                  <a:schemeClr val="tx1"/>
+                </a:solidFill>
+                <a:latin typeface="+mn-lt"/>
+                <a:ea typeface="+mn-ea"/>
+                <a:cs typeface="+mn-cs"/>
+              </a:defRPr>
+            </a:lvl7pPr>
+            <a:lvl8pPr marL="3429000" indent="-228600" algn="l" defTabSz="914400" rtl="0" eaLnBrk="1" latinLnBrk="0" hangingPunct="1">
+              <a:spcBef>
+                <a:spcPct val="20000"/>
+              </a:spcBef>
+              <a:buFont typeface="Arial" pitchFamily="34" charset="0"/>
+              <a:buChar char="•"/>
+              <a:defRPr sz="2000" kern="1200">
+                <a:solidFill>
+                  <a:schemeClr val="tx1"/>
+                </a:solidFill>
+                <a:latin typeface="+mn-lt"/>
+                <a:ea typeface="+mn-ea"/>
+                <a:cs typeface="+mn-cs"/>
+              </a:defRPr>
+            </a:lvl8pPr>
+            <a:lvl9pPr marL="3886200" indent="-228600" algn="l" defTabSz="914400" rtl="0" eaLnBrk="1" latinLnBrk="0" hangingPunct="1">
+              <a:spcBef>
+                <a:spcPct val="20000"/>
+              </a:spcBef>
+              <a:buFont typeface="Arial" pitchFamily="34" charset="0"/>
+              <a:buChar char="•"/>
+              <a:defRPr sz="2000" kern="1200">
+                <a:solidFill>
+                  <a:schemeClr val="tx1"/>
+                </a:solidFill>
+                <a:latin typeface="+mn-lt"/>
+                <a:ea typeface="+mn-ea"/>
+                <a:cs typeface="+mn-cs"/>
+              </a:defRPr>
+            </a:lvl9pPr>
+          </a:lstStyle>
+          <a:p>
+            <a:pPr>
+              <a:buFontTx/>
+              <a:buChar char="-"/>
+            </a:pPr>
+            <a:r>
+              <a:rPr lang="pt-BR" sz="1800" dirty="0" smtClean="0"/>
+              <a:t>Ao trabalhar com banco de dados, utilizar comando Texto para Colunas do Excel</a:t>
+            </a:r>
+            <a:endParaRPr lang="pt-BR" sz="1800" dirty="0"/>
+          </a:p>
+          <a:p>
+            <a:pPr>
+              <a:buFontTx/>
+              <a:buChar char="-"/>
+            </a:pPr>
+            <a:r>
+              <a:rPr lang="pt-BR" sz="1800" dirty="0" smtClean="0"/>
+              <a:t>&gt;No comando Abrir, ou copiando do Arquivo </a:t>
+            </a:r>
+            <a:r>
+              <a:rPr lang="pt-BR" sz="1800" dirty="0" err="1" smtClean="0"/>
+              <a:t>txt</a:t>
+            </a:r>
+            <a:r>
+              <a:rPr lang="pt-BR" sz="1800" dirty="0" smtClean="0"/>
+              <a:t> e colando no Excel:</a:t>
+            </a:r>
+          </a:p>
+          <a:p>
+            <a:pPr marL="0" indent="0">
+              <a:buNone/>
+            </a:pPr>
+            <a:r>
+              <a:rPr lang="pt-BR" sz="1800" dirty="0" smtClean="0"/>
+              <a:t>Com a coluna do Texto Selecionada: Guia dados&gt; Grupo Ferramenta de Dados &gt; Texto para Colunas.</a:t>
+            </a:r>
+          </a:p>
+          <a:p>
+            <a:pPr marL="0" indent="0">
+              <a:buNone/>
+            </a:pPr>
+            <a:endParaRPr lang="pt-BR" sz="1800" dirty="0" smtClean="0"/>
+          </a:p>
+          <a:p>
+            <a:pPr marL="0" indent="0">
+              <a:buNone/>
+            </a:pPr>
+            <a:r>
+              <a:rPr lang="pt-BR" sz="1800" dirty="0" smtClean="0"/>
+              <a:t>3 Passos para converter em Excel:</a:t>
+            </a:r>
+          </a:p>
+          <a:p>
+            <a:pPr>
+              <a:buFont typeface="+mj-lt"/>
+              <a:buAutoNum type="arabicPeriod"/>
+            </a:pPr>
+            <a:r>
+              <a:rPr lang="pt-BR" sz="1800" dirty="0" smtClean="0"/>
+              <a:t>Coluna com </a:t>
+            </a:r>
+            <a:r>
+              <a:rPr lang="pt-BR" sz="1800" dirty="0" smtClean="0"/>
+              <a:t>tamanho </a:t>
+            </a:r>
+            <a:r>
+              <a:rPr lang="pt-BR" sz="1800" dirty="0" smtClean="0"/>
+              <a:t>Fixo ou existe algum </a:t>
+            </a:r>
+            <a:r>
+              <a:rPr lang="pt-BR" sz="1800" dirty="0" smtClean="0"/>
+              <a:t>carácter </a:t>
+            </a:r>
+            <a:r>
+              <a:rPr lang="pt-BR" sz="1800" dirty="0" smtClean="0"/>
+              <a:t>que marca a separação de cada coluna?</a:t>
+            </a:r>
+          </a:p>
+          <a:p>
+            <a:pPr>
+              <a:buFont typeface="+mj-lt"/>
+              <a:buAutoNum type="arabicPeriod"/>
+            </a:pPr>
+            <a:r>
+              <a:rPr lang="pt-BR" sz="1800" dirty="0" smtClean="0"/>
+              <a:t>Onde separam-se as colunas (informar </a:t>
+            </a:r>
+            <a:r>
+              <a:rPr lang="pt-BR" sz="1800" dirty="0" smtClean="0"/>
+              <a:t>carácter </a:t>
+            </a:r>
+            <a:r>
+              <a:rPr lang="pt-BR" sz="1800" dirty="0" smtClean="0"/>
+              <a:t>ou a desenhar a </a:t>
+            </a:r>
+            <a:r>
+              <a:rPr lang="pt-BR" sz="1800" dirty="0" smtClean="0"/>
+              <a:t>divisória de coluna)</a:t>
+            </a:r>
+            <a:endParaRPr lang="pt-BR" sz="1800" dirty="0" smtClean="0"/>
+          </a:p>
+          <a:p>
+            <a:pPr>
+              <a:buFont typeface="+mj-lt"/>
+              <a:buAutoNum type="arabicPeriod"/>
+            </a:pPr>
+            <a:r>
+              <a:rPr lang="pt-BR" sz="1800" dirty="0" smtClean="0"/>
+              <a:t>Dizer o tipo de dado de cada Coluna (texto ou </a:t>
+            </a:r>
+            <a:r>
+              <a:rPr lang="pt-BR" sz="1800" dirty="0" smtClean="0"/>
+              <a:t>número).</a:t>
+            </a:r>
+          </a:p>
+          <a:p>
+            <a:pPr marL="0" indent="0">
+              <a:buNone/>
+            </a:pPr>
+            <a:endParaRPr lang="pt-BR" sz="1800" dirty="0"/>
+          </a:p>
+          <a:p>
+            <a:pPr marL="0" indent="0">
+              <a:buNone/>
+            </a:pPr>
+            <a:endParaRPr lang="pt-BR" sz="1800" dirty="0" smtClean="0"/>
+          </a:p>
+          <a:p>
+            <a:pPr>
+              <a:buFontTx/>
+              <a:buChar char="-"/>
+            </a:pPr>
+            <a:endParaRPr lang="pt-BR" sz="1800" dirty="0" smtClean="0"/>
+          </a:p>
+          <a:p>
+            <a:pPr marL="0" indent="0">
+              <a:buNone/>
+            </a:pPr>
+            <a:endParaRPr lang="pt-BR" sz="1800" dirty="0" smtClean="0"/>
+          </a:p>
+          <a:p>
+            <a:pPr>
+              <a:buFontTx/>
+              <a:buChar char="-"/>
+            </a:pPr>
+            <a:endParaRPr lang="pt-BR" sz="1800" dirty="0" smtClean="0"/>
+          </a:p>
+          <a:p>
+            <a:pPr marL="0" indent="0">
+              <a:buFont typeface="Arial" charset="0"/>
+              <a:buNone/>
+            </a:pPr>
+            <a:endParaRPr lang="pt-BR" sz="1800" dirty="0" smtClean="0"/>
+          </a:p>
+        </p:txBody>
+      </p:sp>
+      <p:pic>
+        <p:nvPicPr>
+          <p:cNvPr id="3" name="Imagem 2"/>
+          <p:cNvPicPr>
+            <a:picLocks noChangeAspect="1"/>
+          </p:cNvPicPr>
+          <p:nvPr/>
+        </p:nvPicPr>
+        <p:blipFill>
+          <a:blip r:embed="rId2"/>
+          <a:stretch>
+            <a:fillRect/>
+          </a:stretch>
+        </p:blipFill>
+        <p:spPr>
+          <a:xfrm>
+            <a:off x="3852217" y="4094078"/>
+            <a:ext cx="2775305" cy="2231963"/>
+          </a:xfrm>
+          <a:prstGeom prst="rect">
+            <a:avLst/>
+          </a:prstGeom>
+        </p:spPr>
+      </p:pic>
+      <p:pic>
+        <p:nvPicPr>
+          <p:cNvPr id="4" name="Imagem 3"/>
+          <p:cNvPicPr>
+            <a:picLocks noChangeAspect="1"/>
+          </p:cNvPicPr>
+          <p:nvPr/>
+        </p:nvPicPr>
+        <p:blipFill>
+          <a:blip r:embed="rId3"/>
+          <a:stretch>
+            <a:fillRect/>
+          </a:stretch>
+        </p:blipFill>
+        <p:spPr>
+          <a:xfrm>
+            <a:off x="731687" y="4094078"/>
+            <a:ext cx="2775305" cy="2231963"/>
+          </a:xfrm>
+          <a:prstGeom prst="rect">
+            <a:avLst/>
+          </a:prstGeom>
+        </p:spPr>
+      </p:pic>
+      <p:pic>
+        <p:nvPicPr>
+          <p:cNvPr id="5" name="Imagem 4"/>
+          <p:cNvPicPr>
+            <a:picLocks noChangeAspect="1"/>
+          </p:cNvPicPr>
+          <p:nvPr/>
+        </p:nvPicPr>
+        <p:blipFill>
+          <a:blip r:embed="rId4"/>
+          <a:stretch>
+            <a:fillRect/>
+          </a:stretch>
+        </p:blipFill>
+        <p:spPr>
+          <a:xfrm>
+            <a:off x="6972747" y="4094078"/>
+            <a:ext cx="2786063" cy="2240615"/>
+          </a:xfrm>
+          <a:prstGeom prst="rect">
+            <a:avLst/>
+          </a:prstGeom>
+        </p:spPr>
+      </p:pic>
+      <p:sp>
+        <p:nvSpPr>
+          <p:cNvPr id="7" name="Elipse 6"/>
+          <p:cNvSpPr/>
+          <p:nvPr/>
+        </p:nvSpPr>
+        <p:spPr>
+          <a:xfrm>
+            <a:off x="10269070" y="2431262"/>
+            <a:ext cx="1798319" cy="1493520"/>
+          </a:xfrm>
+          <a:prstGeom prst="ellipse">
+            <a:avLst/>
+          </a:prstGeom>
+          <a:solidFill>
+            <a:schemeClr val="accent2"/>
+          </a:solidFill>
+        </p:spPr>
+        <p:style>
+          <a:lnRef idx="2">
+            <a:schemeClr val="accent1">
+              <a:shade val="50000"/>
+            </a:schemeClr>
+          </a:lnRef>
+          <a:fillRef idx="1">
+            <a:schemeClr val="accent1"/>
+          </a:fillRef>
+          <a:effectRef idx="0">
+            <a:schemeClr val="accent1"/>
+          </a:effectRef>
+          <a:fontRef idx="minor">
+            <a:schemeClr val="lt1"/>
+          </a:fontRef>
+        </p:style>
+        <p:txBody>
+          <a:bodyPr rtlCol="0" anchor="ctr"/>
+          <a:lstStyle/>
+          <a:p>
+            <a:pPr algn="ctr"/>
+            <a:r>
+              <a:rPr lang="pt-BR" dirty="0" smtClean="0"/>
+              <a:t>Paramos aqui</a:t>
+            </a:r>
+            <a:endParaRPr lang="pt-BR" dirty="0"/>
+          </a:p>
+        </p:txBody>
+      </p:sp>
+    </p:spTree>
+    <p:extLst>
+      <p:ext uri="{BB962C8B-B14F-4D97-AF65-F5344CB8AC3E}">
+        <p14:creationId xmlns:p14="http://schemas.microsoft.com/office/powerpoint/2010/main" val="3610631048"/>
       </p:ext>
     </p:extLst>
   </p:cSld>

</xml_diff>